<commit_message>
Semana 14| Dia 1 | Desarrollo de escrito parte 1
</commit_message>
<xml_diff>
--- a/0_documentation/Imágenes.pptx
+++ b/0_documentation/Imágenes.pptx
@@ -6,6 +6,8 @@
   </p:sldMasterIdLst>
   <p:sldIdLst>
     <p:sldId id="256" r:id="rId2"/>
+    <p:sldId id="257" r:id="rId3"/>
+    <p:sldId id="258" r:id="rId4"/>
   </p:sldIdLst>
   <p:sldSz cx="12192000" cy="6858000"/>
   <p:notesSz cx="6858000" cy="9144000"/>
@@ -104,6 +106,11 @@
       </a:defRPr>
     </a:lvl9pPr>
   </p:defaultTextStyle>
+  <p:extLst>
+    <p:ext uri="{EFAFB233-063F-42B5-8137-9DF3F51BA10A}">
+      <p15:sldGuideLst xmlns:p15="http://schemas.microsoft.com/office/powerpoint/2012/main"/>
+    </p:ext>
+  </p:extLst>
 </p:presentation>
 </file>
 
@@ -254,7 +261,7 @@
           <a:p>
             <a:fld id="{FF7BAE06-CCE5-4E0A-BDC5-D73BC5D61D7A}" type="datetimeFigureOut">
               <a:rPr lang="en-US" smtClean="0"/>
-              <a:t>12/29/2022</a:t>
+              <a:t>19-Feb-23</a:t>
             </a:fld>
             <a:endParaRPr lang="en-US"/>
           </a:p>
@@ -452,7 +459,7 @@
           <a:p>
             <a:fld id="{FF7BAE06-CCE5-4E0A-BDC5-D73BC5D61D7A}" type="datetimeFigureOut">
               <a:rPr lang="en-US" smtClean="0"/>
-              <a:t>12/29/2022</a:t>
+              <a:t>19-Feb-23</a:t>
             </a:fld>
             <a:endParaRPr lang="en-US"/>
           </a:p>
@@ -660,7 +667,7 @@
           <a:p>
             <a:fld id="{FF7BAE06-CCE5-4E0A-BDC5-D73BC5D61D7A}" type="datetimeFigureOut">
               <a:rPr lang="en-US" smtClean="0"/>
-              <a:t>12/29/2022</a:t>
+              <a:t>19-Feb-23</a:t>
             </a:fld>
             <a:endParaRPr lang="en-US"/>
           </a:p>
@@ -858,7 +865,7 @@
           <a:p>
             <a:fld id="{FF7BAE06-CCE5-4E0A-BDC5-D73BC5D61D7A}" type="datetimeFigureOut">
               <a:rPr lang="en-US" smtClean="0"/>
-              <a:t>12/29/2022</a:t>
+              <a:t>19-Feb-23</a:t>
             </a:fld>
             <a:endParaRPr lang="en-US"/>
           </a:p>
@@ -1133,7 +1140,7 @@
           <a:p>
             <a:fld id="{FF7BAE06-CCE5-4E0A-BDC5-D73BC5D61D7A}" type="datetimeFigureOut">
               <a:rPr lang="en-US" smtClean="0"/>
-              <a:t>12/29/2022</a:t>
+              <a:t>19-Feb-23</a:t>
             </a:fld>
             <a:endParaRPr lang="en-US"/>
           </a:p>
@@ -1398,7 +1405,7 @@
           <a:p>
             <a:fld id="{FF7BAE06-CCE5-4E0A-BDC5-D73BC5D61D7A}" type="datetimeFigureOut">
               <a:rPr lang="en-US" smtClean="0"/>
-              <a:t>12/29/2022</a:t>
+              <a:t>19-Feb-23</a:t>
             </a:fld>
             <a:endParaRPr lang="en-US"/>
           </a:p>
@@ -1810,7 +1817,7 @@
           <a:p>
             <a:fld id="{FF7BAE06-CCE5-4E0A-BDC5-D73BC5D61D7A}" type="datetimeFigureOut">
               <a:rPr lang="en-US" smtClean="0"/>
-              <a:t>12/29/2022</a:t>
+              <a:t>19-Feb-23</a:t>
             </a:fld>
             <a:endParaRPr lang="en-US"/>
           </a:p>
@@ -1951,7 +1958,7 @@
           <a:p>
             <a:fld id="{FF7BAE06-CCE5-4E0A-BDC5-D73BC5D61D7A}" type="datetimeFigureOut">
               <a:rPr lang="en-US" smtClean="0"/>
-              <a:t>12/29/2022</a:t>
+              <a:t>19-Feb-23</a:t>
             </a:fld>
             <a:endParaRPr lang="en-US"/>
           </a:p>
@@ -2064,7 +2071,7 @@
           <a:p>
             <a:fld id="{FF7BAE06-CCE5-4E0A-BDC5-D73BC5D61D7A}" type="datetimeFigureOut">
               <a:rPr lang="en-US" smtClean="0"/>
-              <a:t>12/29/2022</a:t>
+              <a:t>19-Feb-23</a:t>
             </a:fld>
             <a:endParaRPr lang="en-US"/>
           </a:p>
@@ -2375,7 +2382,7 @@
           <a:p>
             <a:fld id="{FF7BAE06-CCE5-4E0A-BDC5-D73BC5D61D7A}" type="datetimeFigureOut">
               <a:rPr lang="en-US" smtClean="0"/>
-              <a:t>12/29/2022</a:t>
+              <a:t>19-Feb-23</a:t>
             </a:fld>
             <a:endParaRPr lang="en-US"/>
           </a:p>
@@ -2663,7 +2670,7 @@
           <a:p>
             <a:fld id="{FF7BAE06-CCE5-4E0A-BDC5-D73BC5D61D7A}" type="datetimeFigureOut">
               <a:rPr lang="en-US" smtClean="0"/>
-              <a:t>12/29/2022</a:t>
+              <a:t>19-Feb-23</a:t>
             </a:fld>
             <a:endParaRPr lang="en-US"/>
           </a:p>
@@ -2904,7 +2911,7 @@
           <a:p>
             <a:fld id="{FF7BAE06-CCE5-4E0A-BDC5-D73BC5D61D7A}" type="datetimeFigureOut">
               <a:rPr lang="en-US" smtClean="0"/>
-              <a:t>12/29/2022</a:t>
+              <a:t>19-Feb-23</a:t>
             </a:fld>
             <a:endParaRPr lang="en-US"/>
           </a:p>
@@ -4511,6 +4518,160 @@
 </p:sld>
 </file>
 
+<file path=ppt/slides/slide2.xml><?xml version="1.0" encoding="utf-8"?>
+<p:sld xmlns:a="http://schemas.openxmlformats.org/drawingml/2006/main" xmlns:r="http://schemas.openxmlformats.org/officeDocument/2006/relationships" xmlns:p="http://schemas.openxmlformats.org/presentationml/2006/main">
+  <p:cSld>
+    <p:spTree>
+      <p:nvGrpSpPr>
+        <p:cNvPr id="1" name=""/>
+        <p:cNvGrpSpPr/>
+        <p:nvPr/>
+      </p:nvGrpSpPr>
+      <p:grpSpPr>
+        <a:xfrm>
+          <a:off x="0" y="0"/>
+          <a:ext cx="0" cy="0"/>
+          <a:chOff x="0" y="0"/>
+          <a:chExt cx="0" cy="0"/>
+        </a:xfrm>
+      </p:grpSpPr>
+      <p:pic>
+        <p:nvPicPr>
+          <p:cNvPr id="1026" name="Picture 2">
+            <a:extLst>
+              <a:ext uri="{FF2B5EF4-FFF2-40B4-BE49-F238E27FC236}">
+                <a16:creationId xmlns:a16="http://schemas.microsoft.com/office/drawing/2014/main" id="{A63A0CF8-6819-AAC1-FBBA-52E1CA17A3A0}"/>
+              </a:ext>
+            </a:extLst>
+          </p:cNvPr>
+          <p:cNvPicPr>
+            <a:picLocks noChangeAspect="1" noChangeArrowheads="1"/>
+          </p:cNvPicPr>
+          <p:nvPr/>
+        </p:nvPicPr>
+        <p:blipFill>
+          <a:blip r:embed="rId2">
+            <a:extLst>
+              <a:ext uri="{28A0092B-C50C-407E-A947-70E740481C1C}">
+                <a14:useLocalDpi xmlns:a14="http://schemas.microsoft.com/office/drawing/2010/main" val="0"/>
+              </a:ext>
+            </a:extLst>
+          </a:blip>
+          <a:srcRect/>
+          <a:stretch>
+            <a:fillRect/>
+          </a:stretch>
+        </p:blipFill>
+        <p:spPr bwMode="auto">
+          <a:xfrm>
+            <a:off x="2216785" y="-91440"/>
+            <a:ext cx="7169150" cy="6858000"/>
+          </a:xfrm>
+          <a:prstGeom prst="rect">
+            <a:avLst/>
+          </a:prstGeom>
+          <a:noFill/>
+          <a:extLst>
+            <a:ext uri="{909E8E84-426E-40DD-AFC4-6F175D3DCCD1}">
+              <a14:hiddenFill xmlns:a14="http://schemas.microsoft.com/office/drawing/2010/main">
+                <a:solidFill>
+                  <a:srgbClr val="FFFFFF"/>
+                </a:solidFill>
+              </a14:hiddenFill>
+            </a:ext>
+          </a:extLst>
+        </p:spPr>
+      </p:pic>
+    </p:spTree>
+    <p:extLst>
+      <p:ext uri="{BB962C8B-B14F-4D97-AF65-F5344CB8AC3E}">
+        <p14:creationId xmlns:p14="http://schemas.microsoft.com/office/powerpoint/2010/main" val="1729599675"/>
+      </p:ext>
+    </p:extLst>
+  </p:cSld>
+  <p:clrMapOvr>
+    <a:masterClrMapping/>
+  </p:clrMapOvr>
+</p:sld>
+</file>
+
+<file path=ppt/slides/slide3.xml><?xml version="1.0" encoding="utf-8"?>
+<p:sld xmlns:a="http://schemas.openxmlformats.org/drawingml/2006/main" xmlns:r="http://schemas.openxmlformats.org/officeDocument/2006/relationships" xmlns:p="http://schemas.openxmlformats.org/presentationml/2006/main">
+  <p:cSld>
+    <p:spTree>
+      <p:nvGrpSpPr>
+        <p:cNvPr id="1" name=""/>
+        <p:cNvGrpSpPr/>
+        <p:nvPr/>
+      </p:nvGrpSpPr>
+      <p:grpSpPr>
+        <a:xfrm>
+          <a:off x="0" y="0"/>
+          <a:ext cx="0" cy="0"/>
+          <a:chOff x="0" y="0"/>
+          <a:chExt cx="0" cy="0"/>
+        </a:xfrm>
+      </p:grpSpPr>
+      <p:pic>
+        <p:nvPicPr>
+          <p:cNvPr id="2052" name="Picture 4">
+            <a:extLst>
+              <a:ext uri="{FF2B5EF4-FFF2-40B4-BE49-F238E27FC236}">
+                <a16:creationId xmlns:a16="http://schemas.microsoft.com/office/drawing/2014/main" id="{6C0C0BE7-43D5-2B05-6B92-9E924E8AF2BD}"/>
+              </a:ext>
+            </a:extLst>
+          </p:cNvPr>
+          <p:cNvPicPr>
+            <a:picLocks noChangeAspect="1" noChangeArrowheads="1"/>
+          </p:cNvPicPr>
+          <p:nvPr/>
+        </p:nvPicPr>
+        <p:blipFill>
+          <a:blip r:embed="rId2">
+            <a:extLst>
+              <a:ext uri="{28A0092B-C50C-407E-A947-70E740481C1C}">
+                <a14:useLocalDpi xmlns:a14="http://schemas.microsoft.com/office/drawing/2010/main" val="0"/>
+              </a:ext>
+            </a:extLst>
+          </a:blip>
+          <a:srcRect/>
+          <a:stretch>
+            <a:fillRect/>
+          </a:stretch>
+        </p:blipFill>
+        <p:spPr bwMode="auto">
+          <a:xfrm>
+            <a:off x="2157413" y="85725"/>
+            <a:ext cx="7877175" cy="6686550"/>
+          </a:xfrm>
+          <a:prstGeom prst="rect">
+            <a:avLst/>
+          </a:prstGeom>
+          <a:noFill/>
+          <a:extLst>
+            <a:ext uri="{909E8E84-426E-40DD-AFC4-6F175D3DCCD1}">
+              <a14:hiddenFill xmlns:a14="http://schemas.microsoft.com/office/drawing/2010/main">
+                <a:solidFill>
+                  <a:srgbClr val="FFFFFF"/>
+                </a:solidFill>
+              </a14:hiddenFill>
+            </a:ext>
+          </a:extLst>
+        </p:spPr>
+      </p:pic>
+    </p:spTree>
+    <p:extLst>
+      <p:ext uri="{BB962C8B-B14F-4D97-AF65-F5344CB8AC3E}">
+        <p14:creationId xmlns:p14="http://schemas.microsoft.com/office/powerpoint/2010/main" val="4089536385"/>
+      </p:ext>
+    </p:extLst>
+  </p:cSld>
+  <p:clrMapOvr>
+    <a:masterClrMapping/>
+  </p:clrMapOvr>
+</p:sld>
+</file>
+
 <file path=ppt/theme/theme1.xml><?xml version="1.0" encoding="utf-8"?>
 <a:theme xmlns:a="http://schemas.openxmlformats.org/drawingml/2006/main" name="Office Theme">
   <a:themeElements>

</xml_diff>

<commit_message>
Semana 14| Dia 2| Desarrollo de la metodologia y Desarrollo e implementacion
</commit_message>
<xml_diff>
--- a/0_documentation/Imágenes.pptx
+++ b/0_documentation/Imágenes.pptx
@@ -6,8 +6,9 @@
   </p:sldMasterIdLst>
   <p:sldIdLst>
     <p:sldId id="256" r:id="rId2"/>
-    <p:sldId id="257" r:id="rId3"/>
-    <p:sldId id="258" r:id="rId4"/>
+    <p:sldId id="259" r:id="rId3"/>
+    <p:sldId id="257" r:id="rId4"/>
+    <p:sldId id="258" r:id="rId5"/>
   </p:sldIdLst>
   <p:sldSz cx="12192000" cy="6858000"/>
   <p:notesSz cx="6858000" cy="9144000"/>
@@ -261,7 +262,7 @@
           <a:p>
             <a:fld id="{FF7BAE06-CCE5-4E0A-BDC5-D73BC5D61D7A}" type="datetimeFigureOut">
               <a:rPr lang="en-US" smtClean="0"/>
-              <a:t>19-Feb-23</a:t>
+              <a:t>21-Feb-23</a:t>
             </a:fld>
             <a:endParaRPr lang="en-US"/>
           </a:p>
@@ -459,7 +460,7 @@
           <a:p>
             <a:fld id="{FF7BAE06-CCE5-4E0A-BDC5-D73BC5D61D7A}" type="datetimeFigureOut">
               <a:rPr lang="en-US" smtClean="0"/>
-              <a:t>19-Feb-23</a:t>
+              <a:t>21-Feb-23</a:t>
             </a:fld>
             <a:endParaRPr lang="en-US"/>
           </a:p>
@@ -667,7 +668,7 @@
           <a:p>
             <a:fld id="{FF7BAE06-CCE5-4E0A-BDC5-D73BC5D61D7A}" type="datetimeFigureOut">
               <a:rPr lang="en-US" smtClean="0"/>
-              <a:t>19-Feb-23</a:t>
+              <a:t>21-Feb-23</a:t>
             </a:fld>
             <a:endParaRPr lang="en-US"/>
           </a:p>
@@ -865,7 +866,7 @@
           <a:p>
             <a:fld id="{FF7BAE06-CCE5-4E0A-BDC5-D73BC5D61D7A}" type="datetimeFigureOut">
               <a:rPr lang="en-US" smtClean="0"/>
-              <a:t>19-Feb-23</a:t>
+              <a:t>21-Feb-23</a:t>
             </a:fld>
             <a:endParaRPr lang="en-US"/>
           </a:p>
@@ -1140,7 +1141,7 @@
           <a:p>
             <a:fld id="{FF7BAE06-CCE5-4E0A-BDC5-D73BC5D61D7A}" type="datetimeFigureOut">
               <a:rPr lang="en-US" smtClean="0"/>
-              <a:t>19-Feb-23</a:t>
+              <a:t>21-Feb-23</a:t>
             </a:fld>
             <a:endParaRPr lang="en-US"/>
           </a:p>
@@ -1405,7 +1406,7 @@
           <a:p>
             <a:fld id="{FF7BAE06-CCE5-4E0A-BDC5-D73BC5D61D7A}" type="datetimeFigureOut">
               <a:rPr lang="en-US" smtClean="0"/>
-              <a:t>19-Feb-23</a:t>
+              <a:t>21-Feb-23</a:t>
             </a:fld>
             <a:endParaRPr lang="en-US"/>
           </a:p>
@@ -1817,7 +1818,7 @@
           <a:p>
             <a:fld id="{FF7BAE06-CCE5-4E0A-BDC5-D73BC5D61D7A}" type="datetimeFigureOut">
               <a:rPr lang="en-US" smtClean="0"/>
-              <a:t>19-Feb-23</a:t>
+              <a:t>21-Feb-23</a:t>
             </a:fld>
             <a:endParaRPr lang="en-US"/>
           </a:p>
@@ -1958,7 +1959,7 @@
           <a:p>
             <a:fld id="{FF7BAE06-CCE5-4E0A-BDC5-D73BC5D61D7A}" type="datetimeFigureOut">
               <a:rPr lang="en-US" smtClean="0"/>
-              <a:t>19-Feb-23</a:t>
+              <a:t>21-Feb-23</a:t>
             </a:fld>
             <a:endParaRPr lang="en-US"/>
           </a:p>
@@ -2071,7 +2072,7 @@
           <a:p>
             <a:fld id="{FF7BAE06-CCE5-4E0A-BDC5-D73BC5D61D7A}" type="datetimeFigureOut">
               <a:rPr lang="en-US" smtClean="0"/>
-              <a:t>19-Feb-23</a:t>
+              <a:t>21-Feb-23</a:t>
             </a:fld>
             <a:endParaRPr lang="en-US"/>
           </a:p>
@@ -2382,7 +2383,7 @@
           <a:p>
             <a:fld id="{FF7BAE06-CCE5-4E0A-BDC5-D73BC5D61D7A}" type="datetimeFigureOut">
               <a:rPr lang="en-US" smtClean="0"/>
-              <a:t>19-Feb-23</a:t>
+              <a:t>21-Feb-23</a:t>
             </a:fld>
             <a:endParaRPr lang="en-US"/>
           </a:p>
@@ -2670,7 +2671,7 @@
           <a:p>
             <a:fld id="{FF7BAE06-CCE5-4E0A-BDC5-D73BC5D61D7A}" type="datetimeFigureOut">
               <a:rPr lang="en-US" smtClean="0"/>
-              <a:t>19-Feb-23</a:t>
+              <a:t>21-Feb-23</a:t>
             </a:fld>
             <a:endParaRPr lang="en-US"/>
           </a:p>
@@ -2911,7 +2912,7 @@
           <a:p>
             <a:fld id="{FF7BAE06-CCE5-4E0A-BDC5-D73BC5D61D7A}" type="datetimeFigureOut">
               <a:rPr lang="en-US" smtClean="0"/>
-              <a:t>19-Feb-23</a:t>
+              <a:t>21-Feb-23</a:t>
             </a:fld>
             <a:endParaRPr lang="en-US"/>
           </a:p>
@@ -4537,6 +4538,641 @@
       </p:grpSpPr>
       <p:pic>
         <p:nvPicPr>
+          <p:cNvPr id="4" name="Picture 3">
+            <a:extLst>
+              <a:ext uri="{FF2B5EF4-FFF2-40B4-BE49-F238E27FC236}">
+                <a16:creationId xmlns:a16="http://schemas.microsoft.com/office/drawing/2014/main" id="{3FD5BC34-CCFD-90B8-EBA1-ABDBF814EBA8}"/>
+              </a:ext>
+            </a:extLst>
+          </p:cNvPr>
+          <p:cNvPicPr>
+            <a:picLocks noChangeAspect="1"/>
+          </p:cNvPicPr>
+          <p:nvPr/>
+        </p:nvPicPr>
+        <p:blipFill>
+          <a:blip r:embed="rId2"/>
+          <a:stretch>
+            <a:fillRect/>
+          </a:stretch>
+        </p:blipFill>
+        <p:spPr>
+          <a:xfrm>
+            <a:off x="0" y="392118"/>
+            <a:ext cx="12192000" cy="6073763"/>
+          </a:xfrm>
+          <a:prstGeom prst="rect">
+            <a:avLst/>
+          </a:prstGeom>
+        </p:spPr>
+      </p:pic>
+      <p:sp>
+        <p:nvSpPr>
+          <p:cNvPr id="5" name="Rectangle 4">
+            <a:extLst>
+              <a:ext uri="{FF2B5EF4-FFF2-40B4-BE49-F238E27FC236}">
+                <a16:creationId xmlns:a16="http://schemas.microsoft.com/office/drawing/2014/main" id="{0855525E-3296-9B5B-B655-8301B67A7143}"/>
+              </a:ext>
+            </a:extLst>
+          </p:cNvPr>
+          <p:cNvSpPr/>
+          <p:nvPr/>
+        </p:nvSpPr>
+        <p:spPr>
+          <a:xfrm>
+            <a:off x="983411" y="1725283"/>
+            <a:ext cx="9929004" cy="569343"/>
+          </a:xfrm>
+          <a:prstGeom prst="rect">
+            <a:avLst/>
+          </a:prstGeom>
+          <a:noFill/>
+          <a:ln w="38100" cap="flat" cmpd="sng" algn="ctr">
+            <a:solidFill>
+              <a:schemeClr val="accent4"/>
+            </a:solidFill>
+            <a:prstDash val="solid"/>
+            <a:round/>
+            <a:headEnd type="none" w="med" len="med"/>
+            <a:tailEnd type="none" w="med" len="med"/>
+          </a:ln>
+        </p:spPr>
+        <p:style>
+          <a:lnRef idx="0">
+            <a:scrgbClr r="0" g="0" b="0"/>
+          </a:lnRef>
+          <a:fillRef idx="0">
+            <a:scrgbClr r="0" g="0" b="0"/>
+          </a:fillRef>
+          <a:effectRef idx="0">
+            <a:scrgbClr r="0" g="0" b="0"/>
+          </a:effectRef>
+          <a:fontRef idx="minor">
+            <a:schemeClr val="accent4"/>
+          </a:fontRef>
+        </p:style>
+        <p:txBody>
+          <a:bodyPr rtlCol="0" anchor="ctr"/>
+          <a:lstStyle/>
+          <a:p>
+            <a:pPr algn="ctr"/>
+            <a:endParaRPr lang="en-US"/>
+          </a:p>
+        </p:txBody>
+      </p:sp>
+      <p:sp>
+        <p:nvSpPr>
+          <p:cNvPr id="6" name="Rectangle 5">
+            <a:extLst>
+              <a:ext uri="{FF2B5EF4-FFF2-40B4-BE49-F238E27FC236}">
+                <a16:creationId xmlns:a16="http://schemas.microsoft.com/office/drawing/2014/main" id="{BB2D748B-26E0-A5B5-DEB5-2E4700C69B0A}"/>
+              </a:ext>
+            </a:extLst>
+          </p:cNvPr>
+          <p:cNvSpPr/>
+          <p:nvPr/>
+        </p:nvSpPr>
+        <p:spPr>
+          <a:xfrm>
+            <a:off x="983411" y="2294626"/>
+            <a:ext cx="9929004" cy="3001993"/>
+          </a:xfrm>
+          <a:prstGeom prst="rect">
+            <a:avLst/>
+          </a:prstGeom>
+          <a:noFill/>
+          <a:ln w="38100" cap="flat" cmpd="sng" algn="ctr">
+            <a:solidFill>
+              <a:srgbClr val="92D050"/>
+            </a:solidFill>
+            <a:prstDash val="solid"/>
+            <a:round/>
+            <a:headEnd type="none" w="med" len="med"/>
+            <a:tailEnd type="none" w="med" len="med"/>
+          </a:ln>
+        </p:spPr>
+        <p:style>
+          <a:lnRef idx="0">
+            <a:scrgbClr r="0" g="0" b="0"/>
+          </a:lnRef>
+          <a:fillRef idx="0">
+            <a:scrgbClr r="0" g="0" b="0"/>
+          </a:fillRef>
+          <a:effectRef idx="0">
+            <a:scrgbClr r="0" g="0" b="0"/>
+          </a:effectRef>
+          <a:fontRef idx="minor">
+            <a:schemeClr val="accent4"/>
+          </a:fontRef>
+        </p:style>
+        <p:txBody>
+          <a:bodyPr rtlCol="0" anchor="ctr"/>
+          <a:lstStyle/>
+          <a:p>
+            <a:pPr algn="ctr"/>
+            <a:endParaRPr lang="en-US"/>
+          </a:p>
+        </p:txBody>
+      </p:sp>
+      <p:sp>
+        <p:nvSpPr>
+          <p:cNvPr id="7" name="Rectangle 6">
+            <a:extLst>
+              <a:ext uri="{FF2B5EF4-FFF2-40B4-BE49-F238E27FC236}">
+                <a16:creationId xmlns:a16="http://schemas.microsoft.com/office/drawing/2014/main" id="{11D5ABDA-A2C9-B583-A8C5-653CD9DEA1D9}"/>
+              </a:ext>
+            </a:extLst>
+          </p:cNvPr>
+          <p:cNvSpPr/>
+          <p:nvPr/>
+        </p:nvSpPr>
+        <p:spPr>
+          <a:xfrm>
+            <a:off x="4804913" y="5296619"/>
+            <a:ext cx="2225615" cy="310551"/>
+          </a:xfrm>
+          <a:prstGeom prst="rect">
+            <a:avLst/>
+          </a:prstGeom>
+          <a:noFill/>
+          <a:ln w="38100" cap="flat" cmpd="sng" algn="ctr">
+            <a:solidFill>
+              <a:srgbClr val="00B0F0"/>
+            </a:solidFill>
+            <a:prstDash val="solid"/>
+            <a:round/>
+            <a:headEnd type="none" w="med" len="med"/>
+            <a:tailEnd type="none" w="med" len="med"/>
+          </a:ln>
+        </p:spPr>
+        <p:style>
+          <a:lnRef idx="0">
+            <a:scrgbClr r="0" g="0" b="0"/>
+          </a:lnRef>
+          <a:fillRef idx="0">
+            <a:scrgbClr r="0" g="0" b="0"/>
+          </a:fillRef>
+          <a:effectRef idx="0">
+            <a:scrgbClr r="0" g="0" b="0"/>
+          </a:effectRef>
+          <a:fontRef idx="minor">
+            <a:schemeClr val="accent4"/>
+          </a:fontRef>
+        </p:style>
+        <p:txBody>
+          <a:bodyPr rtlCol="0" anchor="ctr"/>
+          <a:lstStyle/>
+          <a:p>
+            <a:pPr algn="ctr"/>
+            <a:endParaRPr lang="en-US"/>
+          </a:p>
+        </p:txBody>
+      </p:sp>
+      <p:sp>
+        <p:nvSpPr>
+          <p:cNvPr id="8" name="Rectangle 7">
+            <a:extLst>
+              <a:ext uri="{FF2B5EF4-FFF2-40B4-BE49-F238E27FC236}">
+                <a16:creationId xmlns:a16="http://schemas.microsoft.com/office/drawing/2014/main" id="{433EFAE1-9A65-5EE0-ACFD-F09060824C5A}"/>
+              </a:ext>
+            </a:extLst>
+          </p:cNvPr>
+          <p:cNvSpPr/>
+          <p:nvPr/>
+        </p:nvSpPr>
+        <p:spPr>
+          <a:xfrm>
+            <a:off x="10800272" y="1190445"/>
+            <a:ext cx="353682" cy="310551"/>
+          </a:xfrm>
+          <a:prstGeom prst="rect">
+            <a:avLst/>
+          </a:prstGeom>
+          <a:noFill/>
+          <a:ln w="38100" cap="flat" cmpd="sng" algn="ctr">
+            <a:solidFill>
+              <a:srgbClr val="FF0000"/>
+            </a:solidFill>
+            <a:prstDash val="solid"/>
+            <a:round/>
+            <a:headEnd type="none" w="med" len="med"/>
+            <a:tailEnd type="none" w="med" len="med"/>
+          </a:ln>
+        </p:spPr>
+        <p:style>
+          <a:lnRef idx="0">
+            <a:scrgbClr r="0" g="0" b="0"/>
+          </a:lnRef>
+          <a:fillRef idx="0">
+            <a:scrgbClr r="0" g="0" b="0"/>
+          </a:fillRef>
+          <a:effectRef idx="0">
+            <a:scrgbClr r="0" g="0" b="0"/>
+          </a:effectRef>
+          <a:fontRef idx="minor">
+            <a:schemeClr val="accent4"/>
+          </a:fontRef>
+        </p:style>
+        <p:txBody>
+          <a:bodyPr rtlCol="0" anchor="ctr"/>
+          <a:lstStyle/>
+          <a:p>
+            <a:pPr algn="ctr"/>
+            <a:endParaRPr lang="en-US"/>
+          </a:p>
+        </p:txBody>
+      </p:sp>
+      <p:cxnSp>
+        <p:nvCxnSpPr>
+          <p:cNvPr id="12" name="Straight Arrow Connector 11">
+            <a:extLst>
+              <a:ext uri="{FF2B5EF4-FFF2-40B4-BE49-F238E27FC236}">
+                <a16:creationId xmlns:a16="http://schemas.microsoft.com/office/drawing/2014/main" id="{693D4D8B-3A65-1674-9D74-5E0B06DCE4B3}"/>
+              </a:ext>
+            </a:extLst>
+          </p:cNvPr>
+          <p:cNvCxnSpPr>
+            <a:cxnSpLocks/>
+            <a:stCxn id="8" idx="0"/>
+            <a:endCxn id="13" idx="2"/>
+          </p:cNvCxnSpPr>
+          <p:nvPr/>
+        </p:nvCxnSpPr>
+        <p:spPr>
+          <a:xfrm flipV="1">
+            <a:off x="10977113" y="936767"/>
+            <a:ext cx="0" cy="253678"/>
+          </a:xfrm>
+          <a:prstGeom prst="straightConnector1">
+            <a:avLst/>
+          </a:prstGeom>
+          <a:ln w="38100">
+            <a:solidFill>
+              <a:srgbClr val="FF0000"/>
+            </a:solidFill>
+            <a:tailEnd type="triangle"/>
+          </a:ln>
+        </p:spPr>
+        <p:style>
+          <a:lnRef idx="1">
+            <a:schemeClr val="accent1"/>
+          </a:lnRef>
+          <a:fillRef idx="0">
+            <a:schemeClr val="accent1"/>
+          </a:fillRef>
+          <a:effectRef idx="0">
+            <a:schemeClr val="accent1"/>
+          </a:effectRef>
+          <a:fontRef idx="minor">
+            <a:schemeClr val="tx1"/>
+          </a:fontRef>
+        </p:style>
+      </p:cxnSp>
+      <p:sp>
+        <p:nvSpPr>
+          <p:cNvPr id="13" name="TextBox 12">
+            <a:extLst>
+              <a:ext uri="{FF2B5EF4-FFF2-40B4-BE49-F238E27FC236}">
+                <a16:creationId xmlns:a16="http://schemas.microsoft.com/office/drawing/2014/main" id="{FD476890-47A7-10A3-55DC-7D0E6036DA35}"/>
+              </a:ext>
+            </a:extLst>
+          </p:cNvPr>
+          <p:cNvSpPr txBox="1"/>
+          <p:nvPr/>
+        </p:nvSpPr>
+        <p:spPr>
+          <a:xfrm>
+            <a:off x="10120431" y="628990"/>
+            <a:ext cx="1713364" cy="307777"/>
+          </a:xfrm>
+          <a:prstGeom prst="rect">
+            <a:avLst/>
+          </a:prstGeom>
+          <a:noFill/>
+        </p:spPr>
+        <p:txBody>
+          <a:bodyPr wrap="square" rtlCol="0">
+            <a:spAutoFit/>
+          </a:bodyPr>
+          <a:lstStyle/>
+          <a:p>
+            <a:pPr algn="ctr"/>
+            <a:r>
+              <a:rPr lang="es-ES" sz="1400" b="1" dirty="0">
+                <a:solidFill>
+                  <a:srgbClr val="FF0000"/>
+                </a:solidFill>
+              </a:rPr>
+              <a:t>Botón Cerrar detalle</a:t>
+            </a:r>
+            <a:endParaRPr lang="en-US" sz="1400" b="1" dirty="0">
+              <a:solidFill>
+                <a:srgbClr val="FF0000"/>
+              </a:solidFill>
+            </a:endParaRPr>
+          </a:p>
+        </p:txBody>
+      </p:sp>
+      <p:cxnSp>
+        <p:nvCxnSpPr>
+          <p:cNvPr id="14" name="Straight Arrow Connector 13">
+            <a:extLst>
+              <a:ext uri="{FF2B5EF4-FFF2-40B4-BE49-F238E27FC236}">
+                <a16:creationId xmlns:a16="http://schemas.microsoft.com/office/drawing/2014/main" id="{A9B6B9D0-D05B-A38A-D48C-345B46E85EFB}"/>
+              </a:ext>
+            </a:extLst>
+          </p:cNvPr>
+          <p:cNvCxnSpPr>
+            <a:cxnSpLocks/>
+          </p:cNvCxnSpPr>
+          <p:nvPr/>
+        </p:nvCxnSpPr>
+        <p:spPr>
+          <a:xfrm flipV="1">
+            <a:off x="8069676" y="1125364"/>
+            <a:ext cx="0" cy="597259"/>
+          </a:xfrm>
+          <a:prstGeom prst="straightConnector1">
+            <a:avLst/>
+          </a:prstGeom>
+          <a:ln w="38100">
+            <a:solidFill>
+              <a:srgbClr val="FFC000"/>
+            </a:solidFill>
+            <a:tailEnd type="triangle"/>
+          </a:ln>
+        </p:spPr>
+        <p:style>
+          <a:lnRef idx="1">
+            <a:schemeClr val="accent1"/>
+          </a:lnRef>
+          <a:fillRef idx="0">
+            <a:schemeClr val="accent1"/>
+          </a:fillRef>
+          <a:effectRef idx="0">
+            <a:schemeClr val="accent1"/>
+          </a:effectRef>
+          <a:fontRef idx="minor">
+            <a:schemeClr val="tx1"/>
+          </a:fontRef>
+        </p:style>
+      </p:cxnSp>
+      <p:sp>
+        <p:nvSpPr>
+          <p:cNvPr id="18" name="TextBox 17">
+            <a:extLst>
+              <a:ext uri="{FF2B5EF4-FFF2-40B4-BE49-F238E27FC236}">
+                <a16:creationId xmlns:a16="http://schemas.microsoft.com/office/drawing/2014/main" id="{DDF91EEE-7755-3729-8D2A-8361E19732FD}"/>
+              </a:ext>
+            </a:extLst>
+          </p:cNvPr>
+          <p:cNvSpPr txBox="1"/>
+          <p:nvPr/>
+        </p:nvSpPr>
+        <p:spPr>
+          <a:xfrm>
+            <a:off x="7259453" y="808168"/>
+            <a:ext cx="1646092" cy="307777"/>
+          </a:xfrm>
+          <a:prstGeom prst="rect">
+            <a:avLst/>
+          </a:prstGeom>
+          <a:noFill/>
+        </p:spPr>
+        <p:txBody>
+          <a:bodyPr wrap="none" rtlCol="0">
+            <a:spAutoFit/>
+          </a:bodyPr>
+          <a:lstStyle/>
+          <a:p>
+            <a:r>
+              <a:rPr lang="es-ES" sz="1400" b="1" dirty="0">
+                <a:solidFill>
+                  <a:srgbClr val="FFC000"/>
+                </a:solidFill>
+              </a:rPr>
+              <a:t>Cabecera de detalle</a:t>
+            </a:r>
+            <a:endParaRPr lang="en-US" sz="1400" b="1" dirty="0">
+              <a:solidFill>
+                <a:srgbClr val="FFC000"/>
+              </a:solidFill>
+            </a:endParaRPr>
+          </a:p>
+        </p:txBody>
+      </p:sp>
+      <p:cxnSp>
+        <p:nvCxnSpPr>
+          <p:cNvPr id="25" name="Straight Arrow Connector 24">
+            <a:extLst>
+              <a:ext uri="{FF2B5EF4-FFF2-40B4-BE49-F238E27FC236}">
+                <a16:creationId xmlns:a16="http://schemas.microsoft.com/office/drawing/2014/main" id="{466CF93B-A3EC-7B7D-B172-E9998E40BB2A}"/>
+              </a:ext>
+            </a:extLst>
+          </p:cNvPr>
+          <p:cNvCxnSpPr>
+            <a:cxnSpLocks/>
+            <a:stCxn id="7" idx="2"/>
+          </p:cNvCxnSpPr>
+          <p:nvPr/>
+        </p:nvCxnSpPr>
+        <p:spPr>
+          <a:xfrm flipH="1">
+            <a:off x="5917720" y="5607170"/>
+            <a:ext cx="1" cy="258792"/>
+          </a:xfrm>
+          <a:prstGeom prst="straightConnector1">
+            <a:avLst/>
+          </a:prstGeom>
+          <a:ln w="38100">
+            <a:solidFill>
+              <a:srgbClr val="00B0F0"/>
+            </a:solidFill>
+            <a:tailEnd type="triangle"/>
+          </a:ln>
+        </p:spPr>
+        <p:style>
+          <a:lnRef idx="1">
+            <a:schemeClr val="accent1"/>
+          </a:lnRef>
+          <a:fillRef idx="0">
+            <a:schemeClr val="accent1"/>
+          </a:fillRef>
+          <a:effectRef idx="0">
+            <a:schemeClr val="accent1"/>
+          </a:effectRef>
+          <a:fontRef idx="minor">
+            <a:schemeClr val="tx1"/>
+          </a:fontRef>
+        </p:style>
+      </p:cxnSp>
+      <p:sp>
+        <p:nvSpPr>
+          <p:cNvPr id="29" name="TextBox 28">
+            <a:extLst>
+              <a:ext uri="{FF2B5EF4-FFF2-40B4-BE49-F238E27FC236}">
+                <a16:creationId xmlns:a16="http://schemas.microsoft.com/office/drawing/2014/main" id="{49BF1DCF-5FBD-3740-A8B1-B4F78B4B2DAE}"/>
+              </a:ext>
+            </a:extLst>
+          </p:cNvPr>
+          <p:cNvSpPr txBox="1"/>
+          <p:nvPr/>
+        </p:nvSpPr>
+        <p:spPr>
+          <a:xfrm>
+            <a:off x="4216644" y="5865962"/>
+            <a:ext cx="3462538" cy="307777"/>
+          </a:xfrm>
+          <a:prstGeom prst="rect">
+            <a:avLst/>
+          </a:prstGeom>
+          <a:noFill/>
+        </p:spPr>
+        <p:txBody>
+          <a:bodyPr wrap="square" rtlCol="0">
+            <a:spAutoFit/>
+          </a:bodyPr>
+          <a:lstStyle/>
+          <a:p>
+            <a:pPr algn="ctr"/>
+            <a:r>
+              <a:rPr lang="es-ES" sz="1400" b="1" dirty="0">
+                <a:solidFill>
+                  <a:srgbClr val="00B0F0"/>
+                </a:solidFill>
+              </a:rPr>
+              <a:t>Controladores de página detalle</a:t>
+            </a:r>
+            <a:endParaRPr lang="en-US" sz="1400" b="1" dirty="0">
+              <a:solidFill>
+                <a:srgbClr val="00B0F0"/>
+              </a:solidFill>
+            </a:endParaRPr>
+          </a:p>
+        </p:txBody>
+      </p:sp>
+      <p:sp>
+        <p:nvSpPr>
+          <p:cNvPr id="30" name="TextBox 29">
+            <a:extLst>
+              <a:ext uri="{FF2B5EF4-FFF2-40B4-BE49-F238E27FC236}">
+                <a16:creationId xmlns:a16="http://schemas.microsoft.com/office/drawing/2014/main" id="{004518D8-428E-43E5-7AEC-03BAC99CBE29}"/>
+              </a:ext>
+            </a:extLst>
+          </p:cNvPr>
+          <p:cNvSpPr txBox="1"/>
+          <p:nvPr/>
+        </p:nvSpPr>
+        <p:spPr>
+          <a:xfrm>
+            <a:off x="7648989" y="5713859"/>
+            <a:ext cx="3462538" cy="307777"/>
+          </a:xfrm>
+          <a:prstGeom prst="rect">
+            <a:avLst/>
+          </a:prstGeom>
+          <a:noFill/>
+        </p:spPr>
+        <p:txBody>
+          <a:bodyPr wrap="square" rtlCol="0">
+            <a:spAutoFit/>
+          </a:bodyPr>
+          <a:lstStyle/>
+          <a:p>
+            <a:pPr algn="ctr"/>
+            <a:r>
+              <a:rPr lang="es-ES" sz="1400" b="1" dirty="0">
+                <a:solidFill>
+                  <a:srgbClr val="92D050"/>
+                </a:solidFill>
+              </a:rPr>
+              <a:t>Tabla de detalle</a:t>
+            </a:r>
+            <a:endParaRPr lang="en-US" sz="1400" b="1" dirty="0">
+              <a:solidFill>
+                <a:srgbClr val="92D050"/>
+              </a:solidFill>
+            </a:endParaRPr>
+          </a:p>
+        </p:txBody>
+      </p:sp>
+      <p:cxnSp>
+        <p:nvCxnSpPr>
+          <p:cNvPr id="31" name="Straight Arrow Connector 30">
+            <a:extLst>
+              <a:ext uri="{FF2B5EF4-FFF2-40B4-BE49-F238E27FC236}">
+                <a16:creationId xmlns:a16="http://schemas.microsoft.com/office/drawing/2014/main" id="{EF8AE0CA-83BC-C63B-A192-D1EF58C1D853}"/>
+              </a:ext>
+            </a:extLst>
+          </p:cNvPr>
+          <p:cNvCxnSpPr>
+            <a:cxnSpLocks/>
+            <a:endCxn id="30" idx="0"/>
+          </p:cNvCxnSpPr>
+          <p:nvPr/>
+        </p:nvCxnSpPr>
+        <p:spPr>
+          <a:xfrm>
+            <a:off x="9350066" y="5306038"/>
+            <a:ext cx="30192" cy="407821"/>
+          </a:xfrm>
+          <a:prstGeom prst="straightConnector1">
+            <a:avLst/>
+          </a:prstGeom>
+          <a:ln w="38100">
+            <a:solidFill>
+              <a:srgbClr val="92D050"/>
+            </a:solidFill>
+            <a:tailEnd type="triangle"/>
+          </a:ln>
+        </p:spPr>
+        <p:style>
+          <a:lnRef idx="1">
+            <a:schemeClr val="accent1"/>
+          </a:lnRef>
+          <a:fillRef idx="0">
+            <a:schemeClr val="accent1"/>
+          </a:fillRef>
+          <a:effectRef idx="0">
+            <a:schemeClr val="accent1"/>
+          </a:effectRef>
+          <a:fontRef idx="minor">
+            <a:schemeClr val="tx1"/>
+          </a:fontRef>
+        </p:style>
+      </p:cxnSp>
+    </p:spTree>
+    <p:extLst>
+      <p:ext uri="{BB962C8B-B14F-4D97-AF65-F5344CB8AC3E}">
+        <p14:creationId xmlns:p14="http://schemas.microsoft.com/office/powerpoint/2010/main" val="1417407396"/>
+      </p:ext>
+    </p:extLst>
+  </p:cSld>
+  <p:clrMapOvr>
+    <a:masterClrMapping/>
+  </p:clrMapOvr>
+</p:sld>
+</file>
+
+<file path=ppt/slides/slide3.xml><?xml version="1.0" encoding="utf-8"?>
+<p:sld xmlns:a="http://schemas.openxmlformats.org/drawingml/2006/main" xmlns:r="http://schemas.openxmlformats.org/officeDocument/2006/relationships" xmlns:p="http://schemas.openxmlformats.org/presentationml/2006/main">
+  <p:cSld>
+    <p:spTree>
+      <p:nvGrpSpPr>
+        <p:cNvPr id="1" name=""/>
+        <p:cNvGrpSpPr/>
+        <p:nvPr/>
+      </p:nvGrpSpPr>
+      <p:grpSpPr>
+        <a:xfrm>
+          <a:off x="0" y="0"/>
+          <a:ext cx="0" cy="0"/>
+          <a:chOff x="0" y="0"/>
+          <a:chExt cx="0" cy="0"/>
+        </a:xfrm>
+      </p:grpSpPr>
+      <p:pic>
+        <p:nvPicPr>
           <p:cNvPr id="1026" name="Picture 2">
             <a:extLst>
               <a:ext uri="{FF2B5EF4-FFF2-40B4-BE49-F238E27FC236}">
@@ -4595,7 +5231,7 @@
 </p:sld>
 </file>
 
-<file path=ppt/slides/slide3.xml><?xml version="1.0" encoding="utf-8"?>
+<file path=ppt/slides/slide4.xml><?xml version="1.0" encoding="utf-8"?>
 <p:sld xmlns:a="http://schemas.openxmlformats.org/drawingml/2006/main" xmlns:r="http://schemas.openxmlformats.org/officeDocument/2006/relationships" xmlns:p="http://schemas.openxmlformats.org/presentationml/2006/main">
   <p:cSld>
     <p:spTree>

</xml_diff>

<commit_message>
Semana 14 | Dia 4 | Redaccion de la fase 4 y 5
</commit_message>
<xml_diff>
--- a/0_documentation/Imágenes.pptx
+++ b/0_documentation/Imágenes.pptx
@@ -262,7 +262,7 @@
           <a:p>
             <a:fld id="{FF7BAE06-CCE5-4E0A-BDC5-D73BC5D61D7A}" type="datetimeFigureOut">
               <a:rPr lang="en-US" smtClean="0"/>
-              <a:t>21-Feb-23</a:t>
+              <a:t>23-Feb-23</a:t>
             </a:fld>
             <a:endParaRPr lang="en-US"/>
           </a:p>
@@ -460,7 +460,7 @@
           <a:p>
             <a:fld id="{FF7BAE06-CCE5-4E0A-BDC5-D73BC5D61D7A}" type="datetimeFigureOut">
               <a:rPr lang="en-US" smtClean="0"/>
-              <a:t>21-Feb-23</a:t>
+              <a:t>23-Feb-23</a:t>
             </a:fld>
             <a:endParaRPr lang="en-US"/>
           </a:p>
@@ -668,7 +668,7 @@
           <a:p>
             <a:fld id="{FF7BAE06-CCE5-4E0A-BDC5-D73BC5D61D7A}" type="datetimeFigureOut">
               <a:rPr lang="en-US" smtClean="0"/>
-              <a:t>21-Feb-23</a:t>
+              <a:t>23-Feb-23</a:t>
             </a:fld>
             <a:endParaRPr lang="en-US"/>
           </a:p>
@@ -866,7 +866,7 @@
           <a:p>
             <a:fld id="{FF7BAE06-CCE5-4E0A-BDC5-D73BC5D61D7A}" type="datetimeFigureOut">
               <a:rPr lang="en-US" smtClean="0"/>
-              <a:t>21-Feb-23</a:t>
+              <a:t>23-Feb-23</a:t>
             </a:fld>
             <a:endParaRPr lang="en-US"/>
           </a:p>
@@ -1141,7 +1141,7 @@
           <a:p>
             <a:fld id="{FF7BAE06-CCE5-4E0A-BDC5-D73BC5D61D7A}" type="datetimeFigureOut">
               <a:rPr lang="en-US" smtClean="0"/>
-              <a:t>21-Feb-23</a:t>
+              <a:t>23-Feb-23</a:t>
             </a:fld>
             <a:endParaRPr lang="en-US"/>
           </a:p>
@@ -1406,7 +1406,7 @@
           <a:p>
             <a:fld id="{FF7BAE06-CCE5-4E0A-BDC5-D73BC5D61D7A}" type="datetimeFigureOut">
               <a:rPr lang="en-US" smtClean="0"/>
-              <a:t>21-Feb-23</a:t>
+              <a:t>23-Feb-23</a:t>
             </a:fld>
             <a:endParaRPr lang="en-US"/>
           </a:p>
@@ -1818,7 +1818,7 @@
           <a:p>
             <a:fld id="{FF7BAE06-CCE5-4E0A-BDC5-D73BC5D61D7A}" type="datetimeFigureOut">
               <a:rPr lang="en-US" smtClean="0"/>
-              <a:t>21-Feb-23</a:t>
+              <a:t>23-Feb-23</a:t>
             </a:fld>
             <a:endParaRPr lang="en-US"/>
           </a:p>
@@ -1959,7 +1959,7 @@
           <a:p>
             <a:fld id="{FF7BAE06-CCE5-4E0A-BDC5-D73BC5D61D7A}" type="datetimeFigureOut">
               <a:rPr lang="en-US" smtClean="0"/>
-              <a:t>21-Feb-23</a:t>
+              <a:t>23-Feb-23</a:t>
             </a:fld>
             <a:endParaRPr lang="en-US"/>
           </a:p>
@@ -2072,7 +2072,7 @@
           <a:p>
             <a:fld id="{FF7BAE06-CCE5-4E0A-BDC5-D73BC5D61D7A}" type="datetimeFigureOut">
               <a:rPr lang="en-US" smtClean="0"/>
-              <a:t>21-Feb-23</a:t>
+              <a:t>23-Feb-23</a:t>
             </a:fld>
             <a:endParaRPr lang="en-US"/>
           </a:p>
@@ -2383,7 +2383,7 @@
           <a:p>
             <a:fld id="{FF7BAE06-CCE5-4E0A-BDC5-D73BC5D61D7A}" type="datetimeFigureOut">
               <a:rPr lang="en-US" smtClean="0"/>
-              <a:t>21-Feb-23</a:t>
+              <a:t>23-Feb-23</a:t>
             </a:fld>
             <a:endParaRPr lang="en-US"/>
           </a:p>
@@ -2671,7 +2671,7 @@
           <a:p>
             <a:fld id="{FF7BAE06-CCE5-4E0A-BDC5-D73BC5D61D7A}" type="datetimeFigureOut">
               <a:rPr lang="en-US" smtClean="0"/>
-              <a:t>21-Feb-23</a:t>
+              <a:t>23-Feb-23</a:t>
             </a:fld>
             <a:endParaRPr lang="en-US"/>
           </a:p>
@@ -2912,7 +2912,7 @@
           <a:p>
             <a:fld id="{FF7BAE06-CCE5-4E0A-BDC5-D73BC5D61D7A}" type="datetimeFigureOut">
               <a:rPr lang="en-US" smtClean="0"/>
-              <a:t>21-Feb-23</a:t>
+              <a:t>23-Feb-23</a:t>
             </a:fld>
             <a:endParaRPr lang="en-US"/>
           </a:p>

</xml_diff>

<commit_message>
Semana 14| Dia 5| Documentacion de Fase 4 y 5 Parte 1
</commit_message>
<xml_diff>
--- a/0_documentation/Imágenes.pptx
+++ b/0_documentation/Imágenes.pptx
@@ -6,9 +6,8 @@
   </p:sldMasterIdLst>
   <p:sldIdLst>
     <p:sldId id="256" r:id="rId2"/>
-    <p:sldId id="259" r:id="rId3"/>
-    <p:sldId id="257" r:id="rId4"/>
-    <p:sldId id="258" r:id="rId5"/>
+    <p:sldId id="257" r:id="rId3"/>
+    <p:sldId id="258" r:id="rId4"/>
   </p:sldIdLst>
   <p:sldSz cx="12192000" cy="6858000"/>
   <p:notesSz cx="6858000" cy="9144000"/>
@@ -113,6 +112,473 @@
     </p:ext>
   </p:extLst>
 </p:presentation>
+</file>
+
+<file path=ppt/revisionInfo.xml><?xml version="1.0" encoding="utf-8"?>
+<p1510:revInfo xmlns:a="http://schemas.openxmlformats.org/drawingml/2006/main" xmlns:r="http://schemas.openxmlformats.org/officeDocument/2006/relationships" xmlns:p1510="http://schemas.microsoft.com/office/powerpoint/2015/10/main">
+  <p1510:revLst>
+    <p1510:client id="{5DB930F0-EF14-47FD-B562-6922E2019B37}" v="4" dt="2023-02-24T02:39:41.378"/>
+  </p1510:revLst>
+</p1510:revInfo>
+</file>
+
+<file path=ppt/changesInfos/changesInfo1.xml><?xml version="1.0" encoding="utf-8"?>
+<pc:chgInfo xmlns:a="http://schemas.openxmlformats.org/drawingml/2006/main" xmlns:r="http://schemas.openxmlformats.org/officeDocument/2006/relationships" xmlns:ac="http://schemas.microsoft.com/office/drawing/2013/main/command" xmlns:pc="http://schemas.microsoft.com/office/powerpoint/2013/main/command">
+  <pc:docChgLst>
+    <pc:chgData name="SERGIO ANDRES JIMENEZ REINO" userId="17e99768-9d4e-4e54-a340-56f767f062d8" providerId="ADAL" clId="{30134F7C-F6A3-4EB4-8B0D-F5248C0EC918}"/>
+    <pc:docChg chg="undo custSel addSld delSld modSld">
+      <pc:chgData name="SERGIO ANDRES JIMENEZ REINO" userId="17e99768-9d4e-4e54-a340-56f767f062d8" providerId="ADAL" clId="{30134F7C-F6A3-4EB4-8B0D-F5248C0EC918}" dt="2023-02-07T14:59:20.455" v="533" actId="1076"/>
+      <pc:docMkLst>
+        <pc:docMk/>
+      </pc:docMkLst>
+      <pc:sldChg chg="addSp delSp modSp mod">
+        <pc:chgData name="SERGIO ANDRES JIMENEZ REINO" userId="17e99768-9d4e-4e54-a340-56f767f062d8" providerId="ADAL" clId="{30134F7C-F6A3-4EB4-8B0D-F5248C0EC918}" dt="2023-02-07T14:41:24.842" v="5" actId="1076"/>
+        <pc:sldMkLst>
+          <pc:docMk/>
+          <pc:sldMk cId="4276102286" sldId="256"/>
+        </pc:sldMkLst>
+        <pc:spChg chg="mod">
+          <ac:chgData name="SERGIO ANDRES JIMENEZ REINO" userId="17e99768-9d4e-4e54-a340-56f767f062d8" providerId="ADAL" clId="{30134F7C-F6A3-4EB4-8B0D-F5248C0EC918}" dt="2023-02-07T14:41:24.842" v="5" actId="1076"/>
+          <ac:spMkLst>
+            <pc:docMk/>
+            <pc:sldMk cId="4276102286" sldId="256"/>
+            <ac:spMk id="6" creationId="{F01B5BFD-DA88-A0BA-24F4-A0D1B158D028}"/>
+          </ac:spMkLst>
+        </pc:spChg>
+        <pc:graphicFrameChg chg="add del modGraphic">
+          <ac:chgData name="SERGIO ANDRES JIMENEZ REINO" userId="17e99768-9d4e-4e54-a340-56f767f062d8" providerId="ADAL" clId="{30134F7C-F6A3-4EB4-8B0D-F5248C0EC918}" dt="2023-02-07T14:41:23.509" v="4" actId="27309"/>
+          <ac:graphicFrameMkLst>
+            <pc:docMk/>
+            <pc:sldMk cId="4276102286" sldId="256"/>
+            <ac:graphicFrameMk id="4" creationId="{79893082-D6DD-EC91-BB84-8DC9F30C16A7}"/>
+          </ac:graphicFrameMkLst>
+        </pc:graphicFrameChg>
+        <pc:cxnChg chg="mod">
+          <ac:chgData name="SERGIO ANDRES JIMENEZ REINO" userId="17e99768-9d4e-4e54-a340-56f767f062d8" providerId="ADAL" clId="{30134F7C-F6A3-4EB4-8B0D-F5248C0EC918}" dt="2023-02-07T14:41:24.842" v="5" actId="1076"/>
+          <ac:cxnSpMkLst>
+            <pc:docMk/>
+            <pc:sldMk cId="4276102286" sldId="256"/>
+            <ac:cxnSpMk id="26" creationId="{28698504-7A1D-6F38-EA75-ADD1E9EBD529}"/>
+          </ac:cxnSpMkLst>
+        </pc:cxnChg>
+      </pc:sldChg>
+      <pc:sldChg chg="new del">
+        <pc:chgData name="SERGIO ANDRES JIMENEZ REINO" userId="17e99768-9d4e-4e54-a340-56f767f062d8" providerId="ADAL" clId="{30134F7C-F6A3-4EB4-8B0D-F5248C0EC918}" dt="2023-02-07T14:41:21.376" v="3" actId="680"/>
+        <pc:sldMkLst>
+          <pc:docMk/>
+          <pc:sldMk cId="758702048" sldId="257"/>
+        </pc:sldMkLst>
+      </pc:sldChg>
+      <pc:sldChg chg="addSp delSp modSp new mod">
+        <pc:chgData name="SERGIO ANDRES JIMENEZ REINO" userId="17e99768-9d4e-4e54-a340-56f767f062d8" providerId="ADAL" clId="{30134F7C-F6A3-4EB4-8B0D-F5248C0EC918}" dt="2023-02-07T14:59:20.455" v="533" actId="1076"/>
+        <pc:sldMkLst>
+          <pc:docMk/>
+          <pc:sldMk cId="1529367685" sldId="257"/>
+        </pc:sldMkLst>
+        <pc:spChg chg="del">
+          <ac:chgData name="SERGIO ANDRES JIMENEZ REINO" userId="17e99768-9d4e-4e54-a340-56f767f062d8" providerId="ADAL" clId="{30134F7C-F6A3-4EB4-8B0D-F5248C0EC918}" dt="2023-02-07T14:41:31.569" v="7" actId="478"/>
+          <ac:spMkLst>
+            <pc:docMk/>
+            <pc:sldMk cId="1529367685" sldId="257"/>
+            <ac:spMk id="2" creationId="{6B226FAA-6A44-E99E-E466-A1A382FCF26E}"/>
+          </ac:spMkLst>
+        </pc:spChg>
+        <pc:spChg chg="del">
+          <ac:chgData name="SERGIO ANDRES JIMENEZ REINO" userId="17e99768-9d4e-4e54-a340-56f767f062d8" providerId="ADAL" clId="{30134F7C-F6A3-4EB4-8B0D-F5248C0EC918}" dt="2023-02-07T14:41:33.232" v="8" actId="478"/>
+          <ac:spMkLst>
+            <pc:docMk/>
+            <pc:sldMk cId="1529367685" sldId="257"/>
+            <ac:spMk id="3" creationId="{4B985E82-1B06-1857-C439-69FA928FA0C9}"/>
+          </ac:spMkLst>
+        </pc:spChg>
+        <pc:spChg chg="add mod">
+          <ac:chgData name="SERGIO ANDRES JIMENEZ REINO" userId="17e99768-9d4e-4e54-a340-56f767f062d8" providerId="ADAL" clId="{30134F7C-F6A3-4EB4-8B0D-F5248C0EC918}" dt="2023-02-07T14:59:11.061" v="528" actId="1076"/>
+          <ac:spMkLst>
+            <pc:docMk/>
+            <pc:sldMk cId="1529367685" sldId="257"/>
+            <ac:spMk id="4" creationId="{4F955B30-E90C-9F5B-06D4-F9A6C06ABF5E}"/>
+          </ac:spMkLst>
+        </pc:spChg>
+        <pc:spChg chg="add mod">
+          <ac:chgData name="SERGIO ANDRES JIMENEZ REINO" userId="17e99768-9d4e-4e54-a340-56f767f062d8" providerId="ADAL" clId="{30134F7C-F6A3-4EB4-8B0D-F5248C0EC918}" dt="2023-02-07T14:59:11.061" v="528" actId="1076"/>
+          <ac:spMkLst>
+            <pc:docMk/>
+            <pc:sldMk cId="1529367685" sldId="257"/>
+            <ac:spMk id="5" creationId="{4935EBCD-C949-2AA3-0D9A-8AAE68C091A5}"/>
+          </ac:spMkLst>
+        </pc:spChg>
+        <pc:spChg chg="add mod">
+          <ac:chgData name="SERGIO ANDRES JIMENEZ REINO" userId="17e99768-9d4e-4e54-a340-56f767f062d8" providerId="ADAL" clId="{30134F7C-F6A3-4EB4-8B0D-F5248C0EC918}" dt="2023-02-07T14:59:11.061" v="528" actId="1076"/>
+          <ac:spMkLst>
+            <pc:docMk/>
+            <pc:sldMk cId="1529367685" sldId="257"/>
+            <ac:spMk id="6" creationId="{858DE5CE-427D-E46D-4BE5-1813A211A353}"/>
+          </ac:spMkLst>
+        </pc:spChg>
+        <pc:spChg chg="add mod">
+          <ac:chgData name="SERGIO ANDRES JIMENEZ REINO" userId="17e99768-9d4e-4e54-a340-56f767f062d8" providerId="ADAL" clId="{30134F7C-F6A3-4EB4-8B0D-F5248C0EC918}" dt="2023-02-07T14:59:11.061" v="528" actId="1076"/>
+          <ac:spMkLst>
+            <pc:docMk/>
+            <pc:sldMk cId="1529367685" sldId="257"/>
+            <ac:spMk id="7" creationId="{9EBA7A95-1554-A8FF-5CD6-4FC8D0FAD8D4}"/>
+          </ac:spMkLst>
+        </pc:spChg>
+        <pc:spChg chg="add mod">
+          <ac:chgData name="SERGIO ANDRES JIMENEZ REINO" userId="17e99768-9d4e-4e54-a340-56f767f062d8" providerId="ADAL" clId="{30134F7C-F6A3-4EB4-8B0D-F5248C0EC918}" dt="2023-02-07T14:59:11.061" v="528" actId="1076"/>
+          <ac:spMkLst>
+            <pc:docMk/>
+            <pc:sldMk cId="1529367685" sldId="257"/>
+            <ac:spMk id="8" creationId="{D4B14DD8-D17A-4191-5BD7-22812824B6F6}"/>
+          </ac:spMkLst>
+        </pc:spChg>
+        <pc:spChg chg="add mod">
+          <ac:chgData name="SERGIO ANDRES JIMENEZ REINO" userId="17e99768-9d4e-4e54-a340-56f767f062d8" providerId="ADAL" clId="{30134F7C-F6A3-4EB4-8B0D-F5248C0EC918}" dt="2023-02-07T14:59:11.061" v="528" actId="1076"/>
+          <ac:spMkLst>
+            <pc:docMk/>
+            <pc:sldMk cId="1529367685" sldId="257"/>
+            <ac:spMk id="9" creationId="{11F8BEEA-3047-DB02-BCF7-E5E08A005846}"/>
+          </ac:spMkLst>
+        </pc:spChg>
+        <pc:spChg chg="add mod">
+          <ac:chgData name="SERGIO ANDRES JIMENEZ REINO" userId="17e99768-9d4e-4e54-a340-56f767f062d8" providerId="ADAL" clId="{30134F7C-F6A3-4EB4-8B0D-F5248C0EC918}" dt="2023-02-07T14:59:11.061" v="528" actId="1076"/>
+          <ac:spMkLst>
+            <pc:docMk/>
+            <pc:sldMk cId="1529367685" sldId="257"/>
+            <ac:spMk id="10" creationId="{7A71065C-7BA6-1AEC-19C9-30DF5AA15B4D}"/>
+          </ac:spMkLst>
+        </pc:spChg>
+        <pc:spChg chg="add mod">
+          <ac:chgData name="SERGIO ANDRES JIMENEZ REINO" userId="17e99768-9d4e-4e54-a340-56f767f062d8" providerId="ADAL" clId="{30134F7C-F6A3-4EB4-8B0D-F5248C0EC918}" dt="2023-02-07T14:59:11.061" v="528" actId="1076"/>
+          <ac:spMkLst>
+            <pc:docMk/>
+            <pc:sldMk cId="1529367685" sldId="257"/>
+            <ac:spMk id="11" creationId="{777036E1-82FF-37AF-35E3-E37C4555D6C9}"/>
+          </ac:spMkLst>
+        </pc:spChg>
+        <pc:spChg chg="add mod">
+          <ac:chgData name="SERGIO ANDRES JIMENEZ REINO" userId="17e99768-9d4e-4e54-a340-56f767f062d8" providerId="ADAL" clId="{30134F7C-F6A3-4EB4-8B0D-F5248C0EC918}" dt="2023-02-07T14:59:11.061" v="528" actId="1076"/>
+          <ac:spMkLst>
+            <pc:docMk/>
+            <pc:sldMk cId="1529367685" sldId="257"/>
+            <ac:spMk id="12" creationId="{1A46BBCE-F14B-8A9B-5988-EA5385187036}"/>
+          </ac:spMkLst>
+        </pc:spChg>
+        <pc:spChg chg="add mod">
+          <ac:chgData name="SERGIO ANDRES JIMENEZ REINO" userId="17e99768-9d4e-4e54-a340-56f767f062d8" providerId="ADAL" clId="{30134F7C-F6A3-4EB4-8B0D-F5248C0EC918}" dt="2023-02-07T14:59:11.061" v="528" actId="1076"/>
+          <ac:spMkLst>
+            <pc:docMk/>
+            <pc:sldMk cId="1529367685" sldId="257"/>
+            <ac:spMk id="13" creationId="{D47E7C9D-F28E-B803-D879-B630CC8A4BBA}"/>
+          </ac:spMkLst>
+        </pc:spChg>
+        <pc:spChg chg="add mod">
+          <ac:chgData name="SERGIO ANDRES JIMENEZ REINO" userId="17e99768-9d4e-4e54-a340-56f767f062d8" providerId="ADAL" clId="{30134F7C-F6A3-4EB4-8B0D-F5248C0EC918}" dt="2023-02-07T14:59:11.061" v="528" actId="1076"/>
+          <ac:spMkLst>
+            <pc:docMk/>
+            <pc:sldMk cId="1529367685" sldId="257"/>
+            <ac:spMk id="14" creationId="{9030DCCE-796E-9EAA-1177-C487715A7477}"/>
+          </ac:spMkLst>
+        </pc:spChg>
+        <pc:spChg chg="add mod">
+          <ac:chgData name="SERGIO ANDRES JIMENEZ REINO" userId="17e99768-9d4e-4e54-a340-56f767f062d8" providerId="ADAL" clId="{30134F7C-F6A3-4EB4-8B0D-F5248C0EC918}" dt="2023-02-07T14:59:20.455" v="533" actId="1076"/>
+          <ac:spMkLst>
+            <pc:docMk/>
+            <pc:sldMk cId="1529367685" sldId="257"/>
+            <ac:spMk id="84" creationId="{AF59A7F0-EA9F-04CC-3B22-11AA7335B6D0}"/>
+          </ac:spMkLst>
+        </pc:spChg>
+        <pc:spChg chg="add mod">
+          <ac:chgData name="SERGIO ANDRES JIMENEZ REINO" userId="17e99768-9d4e-4e54-a340-56f767f062d8" providerId="ADAL" clId="{30134F7C-F6A3-4EB4-8B0D-F5248C0EC918}" dt="2023-02-07T14:59:11.061" v="528" actId="1076"/>
+          <ac:spMkLst>
+            <pc:docMk/>
+            <pc:sldMk cId="1529367685" sldId="257"/>
+            <ac:spMk id="85" creationId="{9C1219F5-D004-3046-2CE4-10CC37F31C61}"/>
+          </ac:spMkLst>
+        </pc:spChg>
+        <pc:spChg chg="add mod">
+          <ac:chgData name="SERGIO ANDRES JIMENEZ REINO" userId="17e99768-9d4e-4e54-a340-56f767f062d8" providerId="ADAL" clId="{30134F7C-F6A3-4EB4-8B0D-F5248C0EC918}" dt="2023-02-07T14:59:11.061" v="528" actId="1076"/>
+          <ac:spMkLst>
+            <pc:docMk/>
+            <pc:sldMk cId="1529367685" sldId="257"/>
+            <ac:spMk id="120" creationId="{252BB34E-1F7F-B92A-114D-7A2BE41CEB30}"/>
+          </ac:spMkLst>
+        </pc:spChg>
+        <pc:spChg chg="add del mod">
+          <ac:chgData name="SERGIO ANDRES JIMENEZ REINO" userId="17e99768-9d4e-4e54-a340-56f767f062d8" providerId="ADAL" clId="{30134F7C-F6A3-4EB4-8B0D-F5248C0EC918}" dt="2023-02-07T14:54:32.732" v="334" actId="478"/>
+          <ac:spMkLst>
+            <pc:docMk/>
+            <pc:sldMk cId="1529367685" sldId="257"/>
+            <ac:spMk id="121" creationId="{A12D82AE-E6F7-9463-1865-D302FBBCFBF8}"/>
+          </ac:spMkLst>
+        </pc:spChg>
+        <pc:spChg chg="add mod">
+          <ac:chgData name="SERGIO ANDRES JIMENEZ REINO" userId="17e99768-9d4e-4e54-a340-56f767f062d8" providerId="ADAL" clId="{30134F7C-F6A3-4EB4-8B0D-F5248C0EC918}" dt="2023-02-07T14:59:11.061" v="528" actId="1076"/>
+          <ac:spMkLst>
+            <pc:docMk/>
+            <pc:sldMk cId="1529367685" sldId="257"/>
+            <ac:spMk id="122" creationId="{B212B5F8-C169-48EC-488F-C1B982A070DB}"/>
+          </ac:spMkLst>
+        </pc:spChg>
+        <pc:spChg chg="add mod">
+          <ac:chgData name="SERGIO ANDRES JIMENEZ REINO" userId="17e99768-9d4e-4e54-a340-56f767f062d8" providerId="ADAL" clId="{30134F7C-F6A3-4EB4-8B0D-F5248C0EC918}" dt="2023-02-07T14:59:11.061" v="528" actId="1076"/>
+          <ac:spMkLst>
+            <pc:docMk/>
+            <pc:sldMk cId="1529367685" sldId="257"/>
+            <ac:spMk id="123" creationId="{BE3D24D4-3165-25CC-B2C7-786D84F4620A}"/>
+          </ac:spMkLst>
+        </pc:spChg>
+        <pc:spChg chg="add mod">
+          <ac:chgData name="SERGIO ANDRES JIMENEZ REINO" userId="17e99768-9d4e-4e54-a340-56f767f062d8" providerId="ADAL" clId="{30134F7C-F6A3-4EB4-8B0D-F5248C0EC918}" dt="2023-02-07T14:59:11.061" v="528" actId="1076"/>
+          <ac:spMkLst>
+            <pc:docMk/>
+            <pc:sldMk cId="1529367685" sldId="257"/>
+            <ac:spMk id="124" creationId="{67C6EBDF-09C2-4660-4FB0-07AD284F68DC}"/>
+          </ac:spMkLst>
+        </pc:spChg>
+        <pc:cxnChg chg="add del mod">
+          <ac:chgData name="SERGIO ANDRES JIMENEZ REINO" userId="17e99768-9d4e-4e54-a340-56f767f062d8" providerId="ADAL" clId="{30134F7C-F6A3-4EB4-8B0D-F5248C0EC918}" dt="2023-02-07T14:44:45.938" v="44" actId="478"/>
+          <ac:cxnSpMkLst>
+            <pc:docMk/>
+            <pc:sldMk cId="1529367685" sldId="257"/>
+            <ac:cxnSpMk id="16" creationId="{782F2889-0315-A3D0-962D-CF79087E2B7E}"/>
+          </ac:cxnSpMkLst>
+        </pc:cxnChg>
+        <pc:cxnChg chg="add mod">
+          <ac:chgData name="SERGIO ANDRES JIMENEZ REINO" userId="17e99768-9d4e-4e54-a340-56f767f062d8" providerId="ADAL" clId="{30134F7C-F6A3-4EB4-8B0D-F5248C0EC918}" dt="2023-02-07T14:59:11.061" v="528" actId="1076"/>
+          <ac:cxnSpMkLst>
+            <pc:docMk/>
+            <pc:sldMk cId="1529367685" sldId="257"/>
+            <ac:cxnSpMk id="17" creationId="{D7B9F528-28CE-E5A8-44C7-F7DE4A94FE16}"/>
+          </ac:cxnSpMkLst>
+        </pc:cxnChg>
+        <pc:cxnChg chg="add mod">
+          <ac:chgData name="SERGIO ANDRES JIMENEZ REINO" userId="17e99768-9d4e-4e54-a340-56f767f062d8" providerId="ADAL" clId="{30134F7C-F6A3-4EB4-8B0D-F5248C0EC918}" dt="2023-02-07T14:59:11.061" v="528" actId="1076"/>
+          <ac:cxnSpMkLst>
+            <pc:docMk/>
+            <pc:sldMk cId="1529367685" sldId="257"/>
+            <ac:cxnSpMk id="21" creationId="{E696E53D-1797-1CE2-353B-F5EDA1D638BC}"/>
+          </ac:cxnSpMkLst>
+        </pc:cxnChg>
+        <pc:cxnChg chg="add mod">
+          <ac:chgData name="SERGIO ANDRES JIMENEZ REINO" userId="17e99768-9d4e-4e54-a340-56f767f062d8" providerId="ADAL" clId="{30134F7C-F6A3-4EB4-8B0D-F5248C0EC918}" dt="2023-02-07T14:59:11.061" v="528" actId="1076"/>
+          <ac:cxnSpMkLst>
+            <pc:docMk/>
+            <pc:sldMk cId="1529367685" sldId="257"/>
+            <ac:cxnSpMk id="27" creationId="{58584A5F-16B8-FA9D-2CBF-398EBCFE23EB}"/>
+          </ac:cxnSpMkLst>
+        </pc:cxnChg>
+        <pc:cxnChg chg="add mod">
+          <ac:chgData name="SERGIO ANDRES JIMENEZ REINO" userId="17e99768-9d4e-4e54-a340-56f767f062d8" providerId="ADAL" clId="{30134F7C-F6A3-4EB4-8B0D-F5248C0EC918}" dt="2023-02-07T14:59:11.061" v="528" actId="1076"/>
+          <ac:cxnSpMkLst>
+            <pc:docMk/>
+            <pc:sldMk cId="1529367685" sldId="257"/>
+            <ac:cxnSpMk id="31" creationId="{94C4C0D0-7249-194C-765A-776578DA1ED2}"/>
+          </ac:cxnSpMkLst>
+        </pc:cxnChg>
+        <pc:cxnChg chg="add mod">
+          <ac:chgData name="SERGIO ANDRES JIMENEZ REINO" userId="17e99768-9d4e-4e54-a340-56f767f062d8" providerId="ADAL" clId="{30134F7C-F6A3-4EB4-8B0D-F5248C0EC918}" dt="2023-02-07T14:59:11.061" v="528" actId="1076"/>
+          <ac:cxnSpMkLst>
+            <pc:docMk/>
+            <pc:sldMk cId="1529367685" sldId="257"/>
+            <ac:cxnSpMk id="32" creationId="{56BE1FE9-339A-42EF-4B48-F67883390084}"/>
+          </ac:cxnSpMkLst>
+        </pc:cxnChg>
+        <pc:cxnChg chg="add mod">
+          <ac:chgData name="SERGIO ANDRES JIMENEZ REINO" userId="17e99768-9d4e-4e54-a340-56f767f062d8" providerId="ADAL" clId="{30134F7C-F6A3-4EB4-8B0D-F5248C0EC918}" dt="2023-02-07T14:59:11.061" v="528" actId="1076"/>
+          <ac:cxnSpMkLst>
+            <pc:docMk/>
+            <pc:sldMk cId="1529367685" sldId="257"/>
+            <ac:cxnSpMk id="37" creationId="{B6F23FB4-1246-5BFC-F12C-A7C352244389}"/>
+          </ac:cxnSpMkLst>
+        </pc:cxnChg>
+        <pc:cxnChg chg="add mod">
+          <ac:chgData name="SERGIO ANDRES JIMENEZ REINO" userId="17e99768-9d4e-4e54-a340-56f767f062d8" providerId="ADAL" clId="{30134F7C-F6A3-4EB4-8B0D-F5248C0EC918}" dt="2023-02-07T14:59:11.061" v="528" actId="1076"/>
+          <ac:cxnSpMkLst>
+            <pc:docMk/>
+            <pc:sldMk cId="1529367685" sldId="257"/>
+            <ac:cxnSpMk id="40" creationId="{394802A3-5487-8654-6E00-F57680796947}"/>
+          </ac:cxnSpMkLst>
+        </pc:cxnChg>
+        <pc:cxnChg chg="add mod">
+          <ac:chgData name="SERGIO ANDRES JIMENEZ REINO" userId="17e99768-9d4e-4e54-a340-56f767f062d8" providerId="ADAL" clId="{30134F7C-F6A3-4EB4-8B0D-F5248C0EC918}" dt="2023-02-07T14:59:11.061" v="528" actId="1076"/>
+          <ac:cxnSpMkLst>
+            <pc:docMk/>
+            <pc:sldMk cId="1529367685" sldId="257"/>
+            <ac:cxnSpMk id="44" creationId="{9FC1351A-008E-8CBF-048C-F026B2FA5B7D}"/>
+          </ac:cxnSpMkLst>
+        </pc:cxnChg>
+        <pc:cxnChg chg="add mod">
+          <ac:chgData name="SERGIO ANDRES JIMENEZ REINO" userId="17e99768-9d4e-4e54-a340-56f767f062d8" providerId="ADAL" clId="{30134F7C-F6A3-4EB4-8B0D-F5248C0EC918}" dt="2023-02-07T14:59:11.061" v="528" actId="1076"/>
+          <ac:cxnSpMkLst>
+            <pc:docMk/>
+            <pc:sldMk cId="1529367685" sldId="257"/>
+            <ac:cxnSpMk id="47" creationId="{1A44550C-48E9-D28D-E12E-D299863DBB11}"/>
+          </ac:cxnSpMkLst>
+        </pc:cxnChg>
+        <pc:cxnChg chg="add mod">
+          <ac:chgData name="SERGIO ANDRES JIMENEZ REINO" userId="17e99768-9d4e-4e54-a340-56f767f062d8" providerId="ADAL" clId="{30134F7C-F6A3-4EB4-8B0D-F5248C0EC918}" dt="2023-02-07T14:59:11.061" v="528" actId="1076"/>
+          <ac:cxnSpMkLst>
+            <pc:docMk/>
+            <pc:sldMk cId="1529367685" sldId="257"/>
+            <ac:cxnSpMk id="50" creationId="{93EC0FCD-7BD6-D87A-716B-447B78C92C6B}"/>
+          </ac:cxnSpMkLst>
+        </pc:cxnChg>
+        <pc:cxnChg chg="add mod">
+          <ac:chgData name="SERGIO ANDRES JIMENEZ REINO" userId="17e99768-9d4e-4e54-a340-56f767f062d8" providerId="ADAL" clId="{30134F7C-F6A3-4EB4-8B0D-F5248C0EC918}" dt="2023-02-07T14:59:11.061" v="528" actId="1076"/>
+          <ac:cxnSpMkLst>
+            <pc:docMk/>
+            <pc:sldMk cId="1529367685" sldId="257"/>
+            <ac:cxnSpMk id="53" creationId="{9C347D4D-DDEE-1725-CB9E-CFC189A5A9F1}"/>
+          </ac:cxnSpMkLst>
+        </pc:cxnChg>
+        <pc:cxnChg chg="add mod">
+          <ac:chgData name="SERGIO ANDRES JIMENEZ REINO" userId="17e99768-9d4e-4e54-a340-56f767f062d8" providerId="ADAL" clId="{30134F7C-F6A3-4EB4-8B0D-F5248C0EC918}" dt="2023-02-07T14:59:11.061" v="528" actId="1076"/>
+          <ac:cxnSpMkLst>
+            <pc:docMk/>
+            <pc:sldMk cId="1529367685" sldId="257"/>
+            <ac:cxnSpMk id="57" creationId="{D8D66D31-7959-7261-A124-81C39D195CE6}"/>
+          </ac:cxnSpMkLst>
+        </pc:cxnChg>
+        <pc:cxnChg chg="add del mod">
+          <ac:chgData name="SERGIO ANDRES JIMENEZ REINO" userId="17e99768-9d4e-4e54-a340-56f767f062d8" providerId="ADAL" clId="{30134F7C-F6A3-4EB4-8B0D-F5248C0EC918}" dt="2023-02-07T14:49:13.671" v="253" actId="478"/>
+          <ac:cxnSpMkLst>
+            <pc:docMk/>
+            <pc:sldMk cId="1529367685" sldId="257"/>
+            <ac:cxnSpMk id="60" creationId="{D66954A4-B7D2-5AD0-C6D1-84BEC7CA021B}"/>
+          </ac:cxnSpMkLst>
+        </pc:cxnChg>
+        <pc:cxnChg chg="add del mod">
+          <ac:chgData name="SERGIO ANDRES JIMENEZ REINO" userId="17e99768-9d4e-4e54-a340-56f767f062d8" providerId="ADAL" clId="{30134F7C-F6A3-4EB4-8B0D-F5248C0EC918}" dt="2023-02-07T14:49:11.982" v="251" actId="478"/>
+          <ac:cxnSpMkLst>
+            <pc:docMk/>
+            <pc:sldMk cId="1529367685" sldId="257"/>
+            <ac:cxnSpMk id="65" creationId="{119224D7-19A4-867E-7654-4844D6225623}"/>
+          </ac:cxnSpMkLst>
+        </pc:cxnChg>
+        <pc:cxnChg chg="add del mod">
+          <ac:chgData name="SERGIO ANDRES JIMENEZ REINO" userId="17e99768-9d4e-4e54-a340-56f767f062d8" providerId="ADAL" clId="{30134F7C-F6A3-4EB4-8B0D-F5248C0EC918}" dt="2023-02-07T14:49:12.811" v="252" actId="478"/>
+          <ac:cxnSpMkLst>
+            <pc:docMk/>
+            <pc:sldMk cId="1529367685" sldId="257"/>
+            <ac:cxnSpMk id="69" creationId="{C3E7E3EF-0069-773E-FDEE-0CCA8E027A8B}"/>
+          </ac:cxnSpMkLst>
+        </pc:cxnChg>
+        <pc:cxnChg chg="add mod">
+          <ac:chgData name="SERGIO ANDRES JIMENEZ REINO" userId="17e99768-9d4e-4e54-a340-56f767f062d8" providerId="ADAL" clId="{30134F7C-F6A3-4EB4-8B0D-F5248C0EC918}" dt="2023-02-07T14:59:11.061" v="528" actId="1076"/>
+          <ac:cxnSpMkLst>
+            <pc:docMk/>
+            <pc:sldMk cId="1529367685" sldId="257"/>
+            <ac:cxnSpMk id="73" creationId="{EA465F11-BF42-E2A0-5D8E-92FF5BE281B5}"/>
+          </ac:cxnSpMkLst>
+        </pc:cxnChg>
+        <pc:cxnChg chg="add mod">
+          <ac:chgData name="SERGIO ANDRES JIMENEZ REINO" userId="17e99768-9d4e-4e54-a340-56f767f062d8" providerId="ADAL" clId="{30134F7C-F6A3-4EB4-8B0D-F5248C0EC918}" dt="2023-02-07T14:59:11.061" v="528" actId="1076"/>
+          <ac:cxnSpMkLst>
+            <pc:docMk/>
+            <pc:sldMk cId="1529367685" sldId="257"/>
+            <ac:cxnSpMk id="76" creationId="{ED26E7DF-E506-2D7F-DF40-27C2B68A5D44}"/>
+          </ac:cxnSpMkLst>
+        </pc:cxnChg>
+        <pc:cxnChg chg="add mod">
+          <ac:chgData name="SERGIO ANDRES JIMENEZ REINO" userId="17e99768-9d4e-4e54-a340-56f767f062d8" providerId="ADAL" clId="{30134F7C-F6A3-4EB4-8B0D-F5248C0EC918}" dt="2023-02-07T14:59:11.061" v="528" actId="1076"/>
+          <ac:cxnSpMkLst>
+            <pc:docMk/>
+            <pc:sldMk cId="1529367685" sldId="257"/>
+            <ac:cxnSpMk id="81" creationId="{487DDA88-5F1D-C653-EEA0-EC0E2092D9F9}"/>
+          </ac:cxnSpMkLst>
+        </pc:cxnChg>
+      </pc:sldChg>
+    </pc:docChg>
+  </pc:docChgLst>
+  <pc:docChgLst>
+    <pc:chgData name="SERGIO ANDRES JIMENEZ REINO" userId="17e99768-9d4e-4e54-a340-56f767f062d8" providerId="ADAL" clId="{5DB930F0-EF14-47FD-B562-6922E2019B37}"/>
+    <pc:docChg chg="custSel addSld modSld">
+      <pc:chgData name="SERGIO ANDRES JIMENEZ REINO" userId="17e99768-9d4e-4e54-a340-56f767f062d8" providerId="ADAL" clId="{5DB930F0-EF14-47FD-B562-6922E2019B37}" dt="2023-02-24T02:40:07.017" v="65" actId="20577"/>
+      <pc:docMkLst>
+        <pc:docMk/>
+      </pc:docMkLst>
+      <pc:sldChg chg="addSp delSp modSp new mod">
+        <pc:chgData name="SERGIO ANDRES JIMENEZ REINO" userId="17e99768-9d4e-4e54-a340-56f767f062d8" providerId="ADAL" clId="{5DB930F0-EF14-47FD-B562-6922E2019B37}" dt="2023-02-24T02:40:07.017" v="65" actId="20577"/>
+        <pc:sldMkLst>
+          <pc:docMk/>
+          <pc:sldMk cId="177534790" sldId="258"/>
+        </pc:sldMkLst>
+        <pc:spChg chg="del">
+          <ac:chgData name="SERGIO ANDRES JIMENEZ REINO" userId="17e99768-9d4e-4e54-a340-56f767f062d8" providerId="ADAL" clId="{5DB930F0-EF14-47FD-B562-6922E2019B37}" dt="2023-02-24T02:38:06.244" v="1" actId="478"/>
+          <ac:spMkLst>
+            <pc:docMk/>
+            <pc:sldMk cId="177534790" sldId="258"/>
+            <ac:spMk id="2" creationId="{CD1AC573-9DB9-1E8F-A851-F036ACFB6DF3}"/>
+          </ac:spMkLst>
+        </pc:spChg>
+        <pc:spChg chg="del">
+          <ac:chgData name="SERGIO ANDRES JIMENEZ REINO" userId="17e99768-9d4e-4e54-a340-56f767f062d8" providerId="ADAL" clId="{5DB930F0-EF14-47FD-B562-6922E2019B37}" dt="2023-02-24T02:38:06.244" v="1" actId="478"/>
+          <ac:spMkLst>
+            <pc:docMk/>
+            <pc:sldMk cId="177534790" sldId="258"/>
+            <ac:spMk id="3" creationId="{9642D88D-0B97-0361-518C-FB5DA26332C1}"/>
+          </ac:spMkLst>
+        </pc:spChg>
+        <pc:spChg chg="add mod">
+          <ac:chgData name="SERGIO ANDRES JIMENEZ REINO" userId="17e99768-9d4e-4e54-a340-56f767f062d8" providerId="ADAL" clId="{5DB930F0-EF14-47FD-B562-6922E2019B37}" dt="2023-02-24T02:38:55.955" v="13" actId="14100"/>
+          <ac:spMkLst>
+            <pc:docMk/>
+            <pc:sldMk cId="177534790" sldId="258"/>
+            <ac:spMk id="6" creationId="{9199E652-0AF0-C190-1819-4A5BFE984FF6}"/>
+          </ac:spMkLst>
+        </pc:spChg>
+        <pc:spChg chg="add mod">
+          <ac:chgData name="SERGIO ANDRES JIMENEZ REINO" userId="17e99768-9d4e-4e54-a340-56f767f062d8" providerId="ADAL" clId="{5DB930F0-EF14-47FD-B562-6922E2019B37}" dt="2023-02-24T02:39:03.618" v="14" actId="208"/>
+          <ac:spMkLst>
+            <pc:docMk/>
+            <pc:sldMk cId="177534790" sldId="258"/>
+            <ac:spMk id="7" creationId="{092F92A4-EDB8-6C8E-B920-CECCC8EC4142}"/>
+          </ac:spMkLst>
+        </pc:spChg>
+        <pc:spChg chg="add mod">
+          <ac:chgData name="SERGIO ANDRES JIMENEZ REINO" userId="17e99768-9d4e-4e54-a340-56f767f062d8" providerId="ADAL" clId="{5DB930F0-EF14-47FD-B562-6922E2019B37}" dt="2023-02-24T02:39:36.579" v="36" actId="207"/>
+          <ac:spMkLst>
+            <pc:docMk/>
+            <pc:sldMk cId="177534790" sldId="258"/>
+            <ac:spMk id="10" creationId="{848F7B86-CD98-E758-ECF7-7F88EE4AE277}"/>
+          </ac:spMkLst>
+        </pc:spChg>
+        <pc:spChg chg="add mod">
+          <ac:chgData name="SERGIO ANDRES JIMENEZ REINO" userId="17e99768-9d4e-4e54-a340-56f767f062d8" providerId="ADAL" clId="{5DB930F0-EF14-47FD-B562-6922E2019B37}" dt="2023-02-24T02:40:07.017" v="65" actId="20577"/>
+          <ac:spMkLst>
+            <pc:docMk/>
+            <pc:sldMk cId="177534790" sldId="258"/>
+            <ac:spMk id="11" creationId="{2436F741-29E0-D6CE-2069-57DE6EA95B9F}"/>
+          </ac:spMkLst>
+        </pc:spChg>
+        <pc:picChg chg="add mod">
+          <ac:chgData name="SERGIO ANDRES JIMENEZ REINO" userId="17e99768-9d4e-4e54-a340-56f767f062d8" providerId="ADAL" clId="{5DB930F0-EF14-47FD-B562-6922E2019B37}" dt="2023-02-24T02:38:14.114" v="4" actId="14100"/>
+          <ac:picMkLst>
+            <pc:docMk/>
+            <pc:sldMk cId="177534790" sldId="258"/>
+            <ac:picMk id="5" creationId="{AF3A3F1E-E171-19CB-7290-BB99256129AF}"/>
+          </ac:picMkLst>
+        </pc:picChg>
+        <pc:cxnChg chg="add mod">
+          <ac:chgData name="SERGIO ANDRES JIMENEZ REINO" userId="17e99768-9d4e-4e54-a340-56f767f062d8" providerId="ADAL" clId="{5DB930F0-EF14-47FD-B562-6922E2019B37}" dt="2023-02-24T02:39:16.643" v="17" actId="208"/>
+          <ac:cxnSpMkLst>
+            <pc:docMk/>
+            <pc:sldMk cId="177534790" sldId="258"/>
+            <ac:cxnSpMk id="9" creationId="{65EF0B5B-B8CD-3D2A-B7B3-C20572D3745B}"/>
+          </ac:cxnSpMkLst>
+        </pc:cxnChg>
+        <pc:cxnChg chg="add mod">
+          <ac:chgData name="SERGIO ANDRES JIMENEZ REINO" userId="17e99768-9d4e-4e54-a340-56f767f062d8" providerId="ADAL" clId="{5DB930F0-EF14-47FD-B562-6922E2019B37}" dt="2023-02-24T02:40:07.017" v="65" actId="20577"/>
+          <ac:cxnSpMkLst>
+            <pc:docMk/>
+            <pc:sldMk cId="177534790" sldId="258"/>
+            <ac:cxnSpMk id="12" creationId="{E97FA9DB-AAB5-A0EA-299D-49CECDB51A95}"/>
+          </ac:cxnSpMkLst>
+        </pc:cxnChg>
+      </pc:sldChg>
+    </pc:docChg>
+  </pc:docChgLst>
+</pc:chgInfo>
 </file>
 
 <file path=ppt/slideLayouts/slideLayout1.xml><?xml version="1.0" encoding="utf-8"?>
@@ -4536,42 +5002,69 @@
           <a:chExt cx="0" cy="0"/>
         </a:xfrm>
       </p:grpSpPr>
-      <p:pic>
-        <p:nvPicPr>
-          <p:cNvPr id="4" name="Picture 3">
-            <a:extLst>
-              <a:ext uri="{FF2B5EF4-FFF2-40B4-BE49-F238E27FC236}">
-                <a16:creationId xmlns:a16="http://schemas.microsoft.com/office/drawing/2014/main" id="{3FD5BC34-CCFD-90B8-EBA1-ABDBF814EBA8}"/>
-              </a:ext>
-            </a:extLst>
-          </p:cNvPr>
-          <p:cNvPicPr>
-            <a:picLocks noChangeAspect="1"/>
-          </p:cNvPicPr>
+      <p:sp>
+        <p:nvSpPr>
+          <p:cNvPr id="4" name="Rectangle 3">
+            <a:extLst>
+              <a:ext uri="{FF2B5EF4-FFF2-40B4-BE49-F238E27FC236}">
+                <a16:creationId xmlns:a16="http://schemas.microsoft.com/office/drawing/2014/main" id="{4F955B30-E90C-9F5B-06D4-F9A6C06ABF5E}"/>
+              </a:ext>
+            </a:extLst>
+          </p:cNvPr>
+          <p:cNvSpPr/>
           <p:nvPr/>
-        </p:nvPicPr>
-        <p:blipFill>
-          <a:blip r:embed="rId2"/>
-          <a:stretch>
-            <a:fillRect/>
-          </a:stretch>
-        </p:blipFill>
+        </p:nvSpPr>
         <p:spPr>
           <a:xfrm>
-            <a:off x="0" y="392118"/>
-            <a:ext cx="12192000" cy="6073763"/>
+            <a:off x="4505226" y="2516626"/>
+            <a:ext cx="897147" cy="897147"/>
           </a:xfrm>
           <a:prstGeom prst="rect">
             <a:avLst/>
           </a:prstGeom>
-        </p:spPr>
-      </p:pic>
+          <a:ln>
+            <a:noFill/>
+          </a:ln>
+        </p:spPr>
+        <p:style>
+          <a:lnRef idx="2">
+            <a:schemeClr val="accent1">
+              <a:shade val="50000"/>
+            </a:schemeClr>
+          </a:lnRef>
+          <a:fillRef idx="1">
+            <a:schemeClr val="accent1"/>
+          </a:fillRef>
+          <a:effectRef idx="0">
+            <a:schemeClr val="accent1"/>
+          </a:effectRef>
+          <a:fontRef idx="minor">
+            <a:schemeClr val="lt1"/>
+          </a:fontRef>
+        </p:style>
+        <p:txBody>
+          <a:bodyPr rtlCol="0" anchor="ctr"/>
+          <a:lstStyle/>
+          <a:p>
+            <a:pPr algn="ctr"/>
+            <a:r>
+              <a:rPr lang="es-ES" b="1" dirty="0" err="1"/>
+              <a:t>Dim</a:t>
+            </a:r>
+            <a:r>
+              <a:rPr lang="es-ES" dirty="0"/>
+              <a:t> Razón social</a:t>
+            </a:r>
+            <a:endParaRPr lang="en-US" dirty="0"/>
+          </a:p>
+        </p:txBody>
+      </p:sp>
       <p:sp>
         <p:nvSpPr>
           <p:cNvPr id="5" name="Rectangle 4">
             <a:extLst>
               <a:ext uri="{FF2B5EF4-FFF2-40B4-BE49-F238E27FC236}">
-                <a16:creationId xmlns:a16="http://schemas.microsoft.com/office/drawing/2014/main" id="{0855525E-3296-9B5B-B655-8301B67A7143}"/>
+                <a16:creationId xmlns:a16="http://schemas.microsoft.com/office/drawing/2014/main" id="{4935EBCD-C949-2AA3-0D9A-8AAE68C091A5}"/>
               </a:ext>
             </a:extLst>
           </p:cNvPr>
@@ -4580,8 +5073,530 @@
         </p:nvSpPr>
         <p:spPr>
           <a:xfrm>
-            <a:off x="983411" y="1725283"/>
-            <a:ext cx="9929004" cy="569343"/>
+            <a:off x="4512476" y="4134468"/>
+            <a:ext cx="897147" cy="897147"/>
+          </a:xfrm>
+          <a:prstGeom prst="rect">
+            <a:avLst/>
+          </a:prstGeom>
+          <a:solidFill>
+            <a:schemeClr val="accent4"/>
+          </a:solidFill>
+          <a:ln>
+            <a:noFill/>
+          </a:ln>
+        </p:spPr>
+        <p:style>
+          <a:lnRef idx="2">
+            <a:schemeClr val="accent1">
+              <a:shade val="50000"/>
+            </a:schemeClr>
+          </a:lnRef>
+          <a:fillRef idx="1">
+            <a:schemeClr val="accent1"/>
+          </a:fillRef>
+          <a:effectRef idx="0">
+            <a:schemeClr val="accent1"/>
+          </a:effectRef>
+          <a:fontRef idx="minor">
+            <a:schemeClr val="lt1"/>
+          </a:fontRef>
+        </p:style>
+        <p:txBody>
+          <a:bodyPr rtlCol="0" anchor="ctr"/>
+          <a:lstStyle/>
+          <a:p>
+            <a:pPr algn="ctr"/>
+            <a:r>
+              <a:rPr lang="es-ES" b="1" dirty="0" err="1"/>
+              <a:t>Dim</a:t>
+            </a:r>
+            <a:r>
+              <a:rPr lang="es-ES" dirty="0"/>
+              <a:t> Fecha</a:t>
+            </a:r>
+            <a:endParaRPr lang="en-US" dirty="0"/>
+          </a:p>
+        </p:txBody>
+      </p:sp>
+      <p:sp>
+        <p:nvSpPr>
+          <p:cNvPr id="6" name="Rectangle 5">
+            <a:extLst>
+              <a:ext uri="{FF2B5EF4-FFF2-40B4-BE49-F238E27FC236}">
+                <a16:creationId xmlns:a16="http://schemas.microsoft.com/office/drawing/2014/main" id="{858DE5CE-427D-E46D-4BE5-1813A211A353}"/>
+              </a:ext>
+            </a:extLst>
+          </p:cNvPr>
+          <p:cNvSpPr/>
+          <p:nvPr/>
+        </p:nvSpPr>
+        <p:spPr>
+          <a:xfrm>
+            <a:off x="411686" y="3034255"/>
+            <a:ext cx="897147" cy="897147"/>
+          </a:xfrm>
+          <a:prstGeom prst="rect">
+            <a:avLst/>
+          </a:prstGeom>
+          <a:solidFill>
+            <a:srgbClr val="C00000"/>
+          </a:solidFill>
+          <a:ln>
+            <a:noFill/>
+          </a:ln>
+        </p:spPr>
+        <p:style>
+          <a:lnRef idx="2">
+            <a:schemeClr val="accent1">
+              <a:shade val="50000"/>
+            </a:schemeClr>
+          </a:lnRef>
+          <a:fillRef idx="1">
+            <a:schemeClr val="accent1"/>
+          </a:fillRef>
+          <a:effectRef idx="0">
+            <a:schemeClr val="accent1"/>
+          </a:effectRef>
+          <a:fontRef idx="minor">
+            <a:schemeClr val="lt1"/>
+          </a:fontRef>
+        </p:style>
+        <p:txBody>
+          <a:bodyPr rtlCol="0" anchor="ctr"/>
+          <a:lstStyle/>
+          <a:p>
+            <a:pPr algn="ctr"/>
+            <a:r>
+              <a:rPr lang="es-ES" b="1" dirty="0" err="1"/>
+              <a:t>Dim</a:t>
+            </a:r>
+            <a:r>
+              <a:rPr lang="es-ES" dirty="0"/>
+              <a:t> Curso perfil</a:t>
+            </a:r>
+            <a:endParaRPr lang="en-US" dirty="0"/>
+          </a:p>
+        </p:txBody>
+      </p:sp>
+      <p:sp>
+        <p:nvSpPr>
+          <p:cNvPr id="7" name="Rectangle 6">
+            <a:extLst>
+              <a:ext uri="{FF2B5EF4-FFF2-40B4-BE49-F238E27FC236}">
+                <a16:creationId xmlns:a16="http://schemas.microsoft.com/office/drawing/2014/main" id="{9EBA7A95-1554-A8FF-5CD6-4FC8D0FAD8D4}"/>
+              </a:ext>
+            </a:extLst>
+          </p:cNvPr>
+          <p:cNvSpPr/>
+          <p:nvPr/>
+        </p:nvSpPr>
+        <p:spPr>
+          <a:xfrm>
+            <a:off x="6306771" y="1372807"/>
+            <a:ext cx="897147" cy="897147"/>
+          </a:xfrm>
+          <a:prstGeom prst="rect">
+            <a:avLst/>
+          </a:prstGeom>
+          <a:solidFill>
+            <a:schemeClr val="accent6">
+              <a:lumMod val="60000"/>
+              <a:lumOff val="40000"/>
+            </a:schemeClr>
+          </a:solidFill>
+          <a:ln>
+            <a:noFill/>
+          </a:ln>
+        </p:spPr>
+        <p:style>
+          <a:lnRef idx="2">
+            <a:schemeClr val="accent1">
+              <a:shade val="50000"/>
+            </a:schemeClr>
+          </a:lnRef>
+          <a:fillRef idx="1">
+            <a:schemeClr val="accent1"/>
+          </a:fillRef>
+          <a:effectRef idx="0">
+            <a:schemeClr val="accent1"/>
+          </a:effectRef>
+          <a:fontRef idx="minor">
+            <a:schemeClr val="lt1"/>
+          </a:fontRef>
+        </p:style>
+        <p:txBody>
+          <a:bodyPr rtlCol="0" anchor="ctr"/>
+          <a:lstStyle/>
+          <a:p>
+            <a:pPr algn="ctr"/>
+            <a:r>
+              <a:rPr lang="es-ES" b="1" dirty="0" err="1"/>
+              <a:t>Fact</a:t>
+            </a:r>
+            <a:r>
+              <a:rPr lang="es-ES" dirty="0"/>
+              <a:t> </a:t>
+            </a:r>
+            <a:r>
+              <a:rPr lang="es-ES" dirty="0" err="1"/>
+              <a:t>oc</a:t>
+            </a:r>
+            <a:endParaRPr lang="en-US" dirty="0"/>
+          </a:p>
+        </p:txBody>
+      </p:sp>
+      <p:sp>
+        <p:nvSpPr>
+          <p:cNvPr id="8" name="Rectangle 7">
+            <a:extLst>
+              <a:ext uri="{FF2B5EF4-FFF2-40B4-BE49-F238E27FC236}">
+                <a16:creationId xmlns:a16="http://schemas.microsoft.com/office/drawing/2014/main" id="{D4B14DD8-D17A-4191-5BD7-22812824B6F6}"/>
+              </a:ext>
+            </a:extLst>
+          </p:cNvPr>
+          <p:cNvSpPr/>
+          <p:nvPr/>
+        </p:nvSpPr>
+        <p:spPr>
+          <a:xfrm>
+            <a:off x="6306770" y="3046332"/>
+            <a:ext cx="897147" cy="897147"/>
+          </a:xfrm>
+          <a:prstGeom prst="rect">
+            <a:avLst/>
+          </a:prstGeom>
+          <a:solidFill>
+            <a:schemeClr val="accent6">
+              <a:lumMod val="60000"/>
+              <a:lumOff val="40000"/>
+            </a:schemeClr>
+          </a:solidFill>
+          <a:ln>
+            <a:noFill/>
+          </a:ln>
+        </p:spPr>
+        <p:style>
+          <a:lnRef idx="2">
+            <a:schemeClr val="accent1">
+              <a:shade val="50000"/>
+            </a:schemeClr>
+          </a:lnRef>
+          <a:fillRef idx="1">
+            <a:schemeClr val="accent1"/>
+          </a:fillRef>
+          <a:effectRef idx="0">
+            <a:schemeClr val="accent1"/>
+          </a:effectRef>
+          <a:fontRef idx="minor">
+            <a:schemeClr val="lt1"/>
+          </a:fontRef>
+        </p:style>
+        <p:txBody>
+          <a:bodyPr rtlCol="0" anchor="ctr"/>
+          <a:lstStyle/>
+          <a:p>
+            <a:pPr algn="ctr"/>
+            <a:r>
+              <a:rPr lang="es-ES" b="1" dirty="0" err="1"/>
+              <a:t>Fact</a:t>
+            </a:r>
+            <a:r>
+              <a:rPr lang="es-ES" dirty="0"/>
+              <a:t> </a:t>
+            </a:r>
+            <a:r>
+              <a:rPr lang="es-ES" dirty="0" err="1"/>
+              <a:t>oec</a:t>
+            </a:r>
+            <a:endParaRPr lang="en-US" dirty="0"/>
+          </a:p>
+        </p:txBody>
+      </p:sp>
+      <p:sp>
+        <p:nvSpPr>
+          <p:cNvPr id="9" name="Rectangle 8">
+            <a:extLst>
+              <a:ext uri="{FF2B5EF4-FFF2-40B4-BE49-F238E27FC236}">
+                <a16:creationId xmlns:a16="http://schemas.microsoft.com/office/drawing/2014/main" id="{11F8BEEA-3047-DB02-BCF7-E5E08A005846}"/>
+              </a:ext>
+            </a:extLst>
+          </p:cNvPr>
+          <p:cNvSpPr/>
+          <p:nvPr/>
+        </p:nvSpPr>
+        <p:spPr>
+          <a:xfrm>
+            <a:off x="6306770" y="4719857"/>
+            <a:ext cx="897147" cy="897147"/>
+          </a:xfrm>
+          <a:prstGeom prst="rect">
+            <a:avLst/>
+          </a:prstGeom>
+          <a:solidFill>
+            <a:schemeClr val="accent6">
+              <a:lumMod val="60000"/>
+              <a:lumOff val="40000"/>
+            </a:schemeClr>
+          </a:solidFill>
+          <a:ln>
+            <a:noFill/>
+          </a:ln>
+        </p:spPr>
+        <p:style>
+          <a:lnRef idx="2">
+            <a:schemeClr val="accent1">
+              <a:shade val="50000"/>
+            </a:schemeClr>
+          </a:lnRef>
+          <a:fillRef idx="1">
+            <a:schemeClr val="accent1"/>
+          </a:fillRef>
+          <a:effectRef idx="0">
+            <a:schemeClr val="accent1"/>
+          </a:effectRef>
+          <a:fontRef idx="minor">
+            <a:schemeClr val="lt1"/>
+          </a:fontRef>
+        </p:style>
+        <p:txBody>
+          <a:bodyPr rtlCol="0" anchor="ctr"/>
+          <a:lstStyle/>
+          <a:p>
+            <a:pPr algn="ctr"/>
+            <a:r>
+              <a:rPr lang="es-ES" b="1" dirty="0" err="1"/>
+              <a:t>Fact</a:t>
+            </a:r>
+            <a:r>
+              <a:rPr lang="es-ES" dirty="0"/>
+              <a:t> </a:t>
+            </a:r>
+            <a:r>
+              <a:rPr lang="es-ES" dirty="0" err="1"/>
+              <a:t>ci</a:t>
+            </a:r>
+            <a:endParaRPr lang="en-US" dirty="0"/>
+          </a:p>
+        </p:txBody>
+      </p:sp>
+      <p:sp>
+        <p:nvSpPr>
+          <p:cNvPr id="10" name="Rectangle 9">
+            <a:extLst>
+              <a:ext uri="{FF2B5EF4-FFF2-40B4-BE49-F238E27FC236}">
+                <a16:creationId xmlns:a16="http://schemas.microsoft.com/office/drawing/2014/main" id="{7A71065C-7BA6-1AEC-19C9-30DF5AA15B4D}"/>
+              </a:ext>
+            </a:extLst>
+          </p:cNvPr>
+          <p:cNvSpPr/>
+          <p:nvPr/>
+        </p:nvSpPr>
+        <p:spPr>
+          <a:xfrm>
+            <a:off x="2718182" y="1372807"/>
+            <a:ext cx="897147" cy="897147"/>
+          </a:xfrm>
+          <a:prstGeom prst="rect">
+            <a:avLst/>
+          </a:prstGeom>
+          <a:solidFill>
+            <a:schemeClr val="accent2">
+              <a:lumMod val="60000"/>
+              <a:lumOff val="40000"/>
+            </a:schemeClr>
+          </a:solidFill>
+          <a:ln>
+            <a:noFill/>
+          </a:ln>
+        </p:spPr>
+        <p:style>
+          <a:lnRef idx="2">
+            <a:schemeClr val="accent1">
+              <a:shade val="50000"/>
+            </a:schemeClr>
+          </a:lnRef>
+          <a:fillRef idx="1">
+            <a:schemeClr val="accent1"/>
+          </a:fillRef>
+          <a:effectRef idx="0">
+            <a:schemeClr val="accent1"/>
+          </a:effectRef>
+          <a:fontRef idx="minor">
+            <a:schemeClr val="lt1"/>
+          </a:fontRef>
+        </p:style>
+        <p:txBody>
+          <a:bodyPr rtlCol="0" anchor="ctr"/>
+          <a:lstStyle/>
+          <a:p>
+            <a:pPr algn="ctr"/>
+            <a:r>
+              <a:rPr lang="es-ES" b="1" dirty="0" err="1"/>
+              <a:t>Fact</a:t>
+            </a:r>
+            <a:r>
+              <a:rPr lang="es-ES" dirty="0"/>
+              <a:t> </a:t>
+            </a:r>
+            <a:r>
+              <a:rPr lang="es-ES" dirty="0" err="1"/>
+              <a:t>oc</a:t>
+            </a:r>
+            <a:endParaRPr lang="en-US" dirty="0"/>
+          </a:p>
+        </p:txBody>
+      </p:sp>
+      <p:sp>
+        <p:nvSpPr>
+          <p:cNvPr id="11" name="Rectangle 10">
+            <a:extLst>
+              <a:ext uri="{FF2B5EF4-FFF2-40B4-BE49-F238E27FC236}">
+                <a16:creationId xmlns:a16="http://schemas.microsoft.com/office/drawing/2014/main" id="{777036E1-82FF-37AF-35E3-E37C4555D6C9}"/>
+              </a:ext>
+            </a:extLst>
+          </p:cNvPr>
+          <p:cNvSpPr/>
+          <p:nvPr/>
+        </p:nvSpPr>
+        <p:spPr>
+          <a:xfrm>
+            <a:off x="2718181" y="3046332"/>
+            <a:ext cx="897147" cy="897147"/>
+          </a:xfrm>
+          <a:prstGeom prst="rect">
+            <a:avLst/>
+          </a:prstGeom>
+          <a:solidFill>
+            <a:schemeClr val="accent2">
+              <a:lumMod val="60000"/>
+              <a:lumOff val="40000"/>
+            </a:schemeClr>
+          </a:solidFill>
+          <a:ln>
+            <a:noFill/>
+          </a:ln>
+        </p:spPr>
+        <p:style>
+          <a:lnRef idx="2">
+            <a:schemeClr val="accent1">
+              <a:shade val="50000"/>
+            </a:schemeClr>
+          </a:lnRef>
+          <a:fillRef idx="1">
+            <a:schemeClr val="accent1"/>
+          </a:fillRef>
+          <a:effectRef idx="0">
+            <a:schemeClr val="accent1"/>
+          </a:effectRef>
+          <a:fontRef idx="minor">
+            <a:schemeClr val="lt1"/>
+          </a:fontRef>
+        </p:style>
+        <p:txBody>
+          <a:bodyPr rtlCol="0" anchor="ctr"/>
+          <a:lstStyle/>
+          <a:p>
+            <a:pPr algn="ctr"/>
+            <a:r>
+              <a:rPr lang="es-ES" b="1" dirty="0" err="1"/>
+              <a:t>Fact</a:t>
+            </a:r>
+            <a:r>
+              <a:rPr lang="es-ES" dirty="0"/>
+              <a:t> </a:t>
+            </a:r>
+            <a:r>
+              <a:rPr lang="es-ES" dirty="0" err="1"/>
+              <a:t>oec</a:t>
+            </a:r>
+            <a:endParaRPr lang="en-US" dirty="0"/>
+          </a:p>
+        </p:txBody>
+      </p:sp>
+      <p:sp>
+        <p:nvSpPr>
+          <p:cNvPr id="12" name="Rectangle 11">
+            <a:extLst>
+              <a:ext uri="{FF2B5EF4-FFF2-40B4-BE49-F238E27FC236}">
+                <a16:creationId xmlns:a16="http://schemas.microsoft.com/office/drawing/2014/main" id="{1A46BBCE-F14B-8A9B-5988-EA5385187036}"/>
+              </a:ext>
+            </a:extLst>
+          </p:cNvPr>
+          <p:cNvSpPr/>
+          <p:nvPr/>
+        </p:nvSpPr>
+        <p:spPr>
+          <a:xfrm>
+            <a:off x="2718181" y="4719857"/>
+            <a:ext cx="897147" cy="897147"/>
+          </a:xfrm>
+          <a:prstGeom prst="rect">
+            <a:avLst/>
+          </a:prstGeom>
+          <a:solidFill>
+            <a:schemeClr val="accent2">
+              <a:lumMod val="60000"/>
+              <a:lumOff val="40000"/>
+            </a:schemeClr>
+          </a:solidFill>
+          <a:ln>
+            <a:noFill/>
+          </a:ln>
+        </p:spPr>
+        <p:style>
+          <a:lnRef idx="2">
+            <a:schemeClr val="accent1">
+              <a:shade val="50000"/>
+            </a:schemeClr>
+          </a:lnRef>
+          <a:fillRef idx="1">
+            <a:schemeClr val="accent1"/>
+          </a:fillRef>
+          <a:effectRef idx="0">
+            <a:schemeClr val="accent1"/>
+          </a:effectRef>
+          <a:fontRef idx="minor">
+            <a:schemeClr val="lt1"/>
+          </a:fontRef>
+        </p:style>
+        <p:txBody>
+          <a:bodyPr rtlCol="0" anchor="ctr"/>
+          <a:lstStyle/>
+          <a:p>
+            <a:pPr algn="ctr"/>
+            <a:r>
+              <a:rPr lang="es-ES" b="1" dirty="0" err="1"/>
+              <a:t>Fact</a:t>
+            </a:r>
+            <a:r>
+              <a:rPr lang="es-ES" dirty="0"/>
+              <a:t> </a:t>
+            </a:r>
+            <a:r>
+              <a:rPr lang="es-ES" dirty="0" err="1"/>
+              <a:t>ci</a:t>
+            </a:r>
+            <a:endParaRPr lang="en-US" dirty="0"/>
+          </a:p>
+        </p:txBody>
+      </p:sp>
+      <p:sp>
+        <p:nvSpPr>
+          <p:cNvPr id="13" name="Rectangle 12">
+            <a:extLst>
+              <a:ext uri="{FF2B5EF4-FFF2-40B4-BE49-F238E27FC236}">
+                <a16:creationId xmlns:a16="http://schemas.microsoft.com/office/drawing/2014/main" id="{D47E7C9D-F28E-B803-D879-B630CC8A4BBA}"/>
+              </a:ext>
+            </a:extLst>
+          </p:cNvPr>
+          <p:cNvSpPr/>
+          <p:nvPr/>
+        </p:nvSpPr>
+        <p:spPr>
+          <a:xfrm>
+            <a:off x="5970342" y="1014811"/>
+            <a:ext cx="1561381" cy="4960188"/>
           </a:xfrm>
           <a:prstGeom prst="rect">
             <a:avLst/>
@@ -4589,7 +5604,10 @@
           <a:noFill/>
           <a:ln w="38100" cap="flat" cmpd="sng" algn="ctr">
             <a:solidFill>
-              <a:schemeClr val="accent4"/>
+              <a:schemeClr val="accent6">
+                <a:lumMod val="40000"/>
+                <a:lumOff val="60000"/>
+              </a:schemeClr>
             </a:solidFill>
             <a:prstDash val="solid"/>
             <a:round/>
@@ -4608,7 +5626,7 @@
             <a:scrgbClr r="0" g="0" b="0"/>
           </a:effectRef>
           <a:fontRef idx="minor">
-            <a:schemeClr val="accent4"/>
+            <a:schemeClr val="accent6"/>
           </a:fontRef>
         </p:style>
         <p:txBody>
@@ -4622,10 +5640,10 @@
       </p:sp>
       <p:sp>
         <p:nvSpPr>
-          <p:cNvPr id="6" name="Rectangle 5">
-            <a:extLst>
-              <a:ext uri="{FF2B5EF4-FFF2-40B4-BE49-F238E27FC236}">
-                <a16:creationId xmlns:a16="http://schemas.microsoft.com/office/drawing/2014/main" id="{BB2D748B-26E0-A5B5-DEB5-2E4700C69B0A}"/>
+          <p:cNvPr id="14" name="Rectangle 13">
+            <a:extLst>
+              <a:ext uri="{FF2B5EF4-FFF2-40B4-BE49-F238E27FC236}">
+                <a16:creationId xmlns:a16="http://schemas.microsoft.com/office/drawing/2014/main" id="{9030DCCE-796E-9EAA-1177-C487715A7477}"/>
               </a:ext>
             </a:extLst>
           </p:cNvPr>
@@ -4634,8 +5652,8 @@
         </p:nvSpPr>
         <p:spPr>
           <a:xfrm>
-            <a:off x="983411" y="2294626"/>
-            <a:ext cx="9929004" cy="3001993"/>
+            <a:off x="2386063" y="1014811"/>
+            <a:ext cx="1606586" cy="4960188"/>
           </a:xfrm>
           <a:prstGeom prst="rect">
             <a:avLst/>
@@ -4643,7 +5661,10 @@
           <a:noFill/>
           <a:ln w="38100" cap="flat" cmpd="sng" algn="ctr">
             <a:solidFill>
-              <a:srgbClr val="92D050"/>
+              <a:schemeClr val="accent2">
+                <a:lumMod val="40000"/>
+                <a:lumOff val="60000"/>
+              </a:schemeClr>
             </a:solidFill>
             <a:prstDash val="solid"/>
             <a:round/>
@@ -4662,7 +5683,7 @@
             <a:scrgbClr r="0" g="0" b="0"/>
           </a:effectRef>
           <a:fontRef idx="minor">
-            <a:schemeClr val="accent4"/>
+            <a:schemeClr val="accent6"/>
           </a:fontRef>
         </p:style>
         <p:txBody>
@@ -4674,144 +5695,31 @@
           </a:p>
         </p:txBody>
       </p:sp>
-      <p:sp>
-        <p:nvSpPr>
-          <p:cNvPr id="7" name="Rectangle 6">
-            <a:extLst>
-              <a:ext uri="{FF2B5EF4-FFF2-40B4-BE49-F238E27FC236}">
-                <a16:creationId xmlns:a16="http://schemas.microsoft.com/office/drawing/2014/main" id="{11D5ABDA-A2C9-B583-A8C5-653CD9DEA1D9}"/>
-              </a:ext>
-            </a:extLst>
-          </p:cNvPr>
-          <p:cNvSpPr/>
-          <p:nvPr/>
-        </p:nvSpPr>
-        <p:spPr>
-          <a:xfrm>
-            <a:off x="4804913" y="5296619"/>
-            <a:ext cx="2225615" cy="310551"/>
-          </a:xfrm>
-          <a:prstGeom prst="rect">
-            <a:avLst/>
-          </a:prstGeom>
-          <a:noFill/>
-          <a:ln w="38100" cap="flat" cmpd="sng" algn="ctr">
-            <a:solidFill>
-              <a:srgbClr val="00B0F0"/>
-            </a:solidFill>
-            <a:prstDash val="solid"/>
-            <a:round/>
-            <a:headEnd type="none" w="med" len="med"/>
-            <a:tailEnd type="none" w="med" len="med"/>
-          </a:ln>
-        </p:spPr>
-        <p:style>
-          <a:lnRef idx="0">
-            <a:scrgbClr r="0" g="0" b="0"/>
-          </a:lnRef>
-          <a:fillRef idx="0">
-            <a:scrgbClr r="0" g="0" b="0"/>
-          </a:fillRef>
-          <a:effectRef idx="0">
-            <a:scrgbClr r="0" g="0" b="0"/>
-          </a:effectRef>
-          <a:fontRef idx="minor">
-            <a:schemeClr val="accent4"/>
-          </a:fontRef>
-        </p:style>
-        <p:txBody>
-          <a:bodyPr rtlCol="0" anchor="ctr"/>
-          <a:lstStyle/>
-          <a:p>
-            <a:pPr algn="ctr"/>
-            <a:endParaRPr lang="en-US"/>
-          </a:p>
-        </p:txBody>
-      </p:sp>
-      <p:sp>
-        <p:nvSpPr>
-          <p:cNvPr id="8" name="Rectangle 7">
-            <a:extLst>
-              <a:ext uri="{FF2B5EF4-FFF2-40B4-BE49-F238E27FC236}">
-                <a16:creationId xmlns:a16="http://schemas.microsoft.com/office/drawing/2014/main" id="{433EFAE1-9A65-5EE0-ACFD-F09060824C5A}"/>
-              </a:ext>
-            </a:extLst>
-          </p:cNvPr>
-          <p:cNvSpPr/>
-          <p:nvPr/>
-        </p:nvSpPr>
-        <p:spPr>
-          <a:xfrm>
-            <a:off x="10800272" y="1190445"/>
-            <a:ext cx="353682" cy="310551"/>
-          </a:xfrm>
-          <a:prstGeom prst="rect">
-            <a:avLst/>
-          </a:prstGeom>
-          <a:noFill/>
-          <a:ln w="38100" cap="flat" cmpd="sng" algn="ctr">
-            <a:solidFill>
-              <a:srgbClr val="FF0000"/>
-            </a:solidFill>
-            <a:prstDash val="solid"/>
-            <a:round/>
-            <a:headEnd type="none" w="med" len="med"/>
-            <a:tailEnd type="none" w="med" len="med"/>
-          </a:ln>
-        </p:spPr>
-        <p:style>
-          <a:lnRef idx="0">
-            <a:scrgbClr r="0" g="0" b="0"/>
-          </a:lnRef>
-          <a:fillRef idx="0">
-            <a:scrgbClr r="0" g="0" b="0"/>
-          </a:fillRef>
-          <a:effectRef idx="0">
-            <a:scrgbClr r="0" g="0" b="0"/>
-          </a:effectRef>
-          <a:fontRef idx="minor">
-            <a:schemeClr val="accent4"/>
-          </a:fontRef>
-        </p:style>
-        <p:txBody>
-          <a:bodyPr rtlCol="0" anchor="ctr"/>
-          <a:lstStyle/>
-          <a:p>
-            <a:pPr algn="ctr"/>
-            <a:endParaRPr lang="en-US"/>
-          </a:p>
-        </p:txBody>
-      </p:sp>
       <p:cxnSp>
         <p:nvCxnSpPr>
-          <p:cNvPr id="12" name="Straight Arrow Connector 11">
-            <a:extLst>
-              <a:ext uri="{FF2B5EF4-FFF2-40B4-BE49-F238E27FC236}">
-                <a16:creationId xmlns:a16="http://schemas.microsoft.com/office/drawing/2014/main" id="{693D4D8B-3A65-1674-9D74-5E0B06DCE4B3}"/>
+          <p:cNvPr id="17" name="Straight Connector 16">
+            <a:extLst>
+              <a:ext uri="{FF2B5EF4-FFF2-40B4-BE49-F238E27FC236}">
+                <a16:creationId xmlns:a16="http://schemas.microsoft.com/office/drawing/2014/main" id="{D7B9F528-28CE-E5A8-44C7-F7DE4A94FE16}"/>
               </a:ext>
             </a:extLst>
           </p:cNvPr>
           <p:cNvCxnSpPr>
             <a:cxnSpLocks/>
-            <a:stCxn id="8" idx="0"/>
-            <a:endCxn id="13" idx="2"/>
+            <a:stCxn id="10" idx="3"/>
+            <a:endCxn id="4" idx="1"/>
           </p:cNvCxnSpPr>
           <p:nvPr/>
         </p:nvCxnSpPr>
         <p:spPr>
-          <a:xfrm flipV="1">
-            <a:off x="10977113" y="936767"/>
-            <a:ext cx="0" cy="253678"/>
-          </a:xfrm>
-          <a:prstGeom prst="straightConnector1">
+          <a:xfrm>
+            <a:off x="3615329" y="1821381"/>
+            <a:ext cx="889897" cy="1143819"/>
+          </a:xfrm>
+          <a:prstGeom prst="line">
             <a:avLst/>
           </a:prstGeom>
-          <a:ln w="38100">
-            <a:solidFill>
-              <a:srgbClr val="FF0000"/>
-            </a:solidFill>
-            <a:tailEnd type="triangle"/>
-          </a:ln>
+          <a:ln w="19050"/>
         </p:spPr>
         <p:style>
           <a:lnRef idx="1">
@@ -4828,79 +5736,31 @@
           </a:fontRef>
         </p:style>
       </p:cxnSp>
-      <p:sp>
-        <p:nvSpPr>
-          <p:cNvPr id="13" name="TextBox 12">
-            <a:extLst>
-              <a:ext uri="{FF2B5EF4-FFF2-40B4-BE49-F238E27FC236}">
-                <a16:creationId xmlns:a16="http://schemas.microsoft.com/office/drawing/2014/main" id="{FD476890-47A7-10A3-55DC-7D0E6036DA35}"/>
-              </a:ext>
-            </a:extLst>
-          </p:cNvPr>
-          <p:cNvSpPr txBox="1"/>
-          <p:nvPr/>
-        </p:nvSpPr>
-        <p:spPr>
-          <a:xfrm>
-            <a:off x="10120431" y="628990"/>
-            <a:ext cx="1713364" cy="307777"/>
-          </a:xfrm>
-          <a:prstGeom prst="rect">
-            <a:avLst/>
-          </a:prstGeom>
-          <a:noFill/>
-        </p:spPr>
-        <p:txBody>
-          <a:bodyPr wrap="square" rtlCol="0">
-            <a:spAutoFit/>
-          </a:bodyPr>
-          <a:lstStyle/>
-          <a:p>
-            <a:pPr algn="ctr"/>
-            <a:r>
-              <a:rPr lang="es-ES" sz="1400" b="1" dirty="0">
-                <a:solidFill>
-                  <a:srgbClr val="FF0000"/>
-                </a:solidFill>
-              </a:rPr>
-              <a:t>Botón Cerrar detalle</a:t>
-            </a:r>
-            <a:endParaRPr lang="en-US" sz="1400" b="1" dirty="0">
-              <a:solidFill>
-                <a:srgbClr val="FF0000"/>
-              </a:solidFill>
-            </a:endParaRPr>
-          </a:p>
-        </p:txBody>
-      </p:sp>
       <p:cxnSp>
         <p:nvCxnSpPr>
-          <p:cNvPr id="14" name="Straight Arrow Connector 13">
-            <a:extLst>
-              <a:ext uri="{FF2B5EF4-FFF2-40B4-BE49-F238E27FC236}">
-                <a16:creationId xmlns:a16="http://schemas.microsoft.com/office/drawing/2014/main" id="{A9B6B9D0-D05B-A38A-D48C-345B46E85EFB}"/>
+          <p:cNvPr id="21" name="Straight Connector 20">
+            <a:extLst>
+              <a:ext uri="{FF2B5EF4-FFF2-40B4-BE49-F238E27FC236}">
+                <a16:creationId xmlns:a16="http://schemas.microsoft.com/office/drawing/2014/main" id="{E696E53D-1797-1CE2-353B-F5EDA1D638BC}"/>
               </a:ext>
             </a:extLst>
           </p:cNvPr>
           <p:cNvCxnSpPr>
             <a:cxnSpLocks/>
+            <a:stCxn id="11" idx="3"/>
+            <a:endCxn id="4" idx="1"/>
           </p:cNvCxnSpPr>
           <p:nvPr/>
         </p:nvCxnSpPr>
         <p:spPr>
           <a:xfrm flipV="1">
-            <a:off x="8069676" y="1125364"/>
-            <a:ext cx="0" cy="597259"/>
-          </a:xfrm>
-          <a:prstGeom prst="straightConnector1">
+            <a:off x="3615328" y="2965200"/>
+            <a:ext cx="889898" cy="529706"/>
+          </a:xfrm>
+          <a:prstGeom prst="line">
             <a:avLst/>
           </a:prstGeom>
-          <a:ln w="38100">
-            <a:solidFill>
-              <a:srgbClr val="FFC000"/>
-            </a:solidFill>
-            <a:tailEnd type="triangle"/>
-          </a:ln>
+          <a:ln w="19050"/>
         </p:spPr>
         <p:style>
           <a:lnRef idx="1">
@@ -4917,79 +5777,31 @@
           </a:fontRef>
         </p:style>
       </p:cxnSp>
-      <p:sp>
-        <p:nvSpPr>
-          <p:cNvPr id="18" name="TextBox 17">
-            <a:extLst>
-              <a:ext uri="{FF2B5EF4-FFF2-40B4-BE49-F238E27FC236}">
-                <a16:creationId xmlns:a16="http://schemas.microsoft.com/office/drawing/2014/main" id="{DDF91EEE-7755-3729-8D2A-8361E19732FD}"/>
-              </a:ext>
-            </a:extLst>
-          </p:cNvPr>
-          <p:cNvSpPr txBox="1"/>
-          <p:nvPr/>
-        </p:nvSpPr>
-        <p:spPr>
-          <a:xfrm>
-            <a:off x="7259453" y="808168"/>
-            <a:ext cx="1646092" cy="307777"/>
-          </a:xfrm>
-          <a:prstGeom prst="rect">
-            <a:avLst/>
-          </a:prstGeom>
-          <a:noFill/>
-        </p:spPr>
-        <p:txBody>
-          <a:bodyPr wrap="none" rtlCol="0">
-            <a:spAutoFit/>
-          </a:bodyPr>
-          <a:lstStyle/>
-          <a:p>
-            <a:r>
-              <a:rPr lang="es-ES" sz="1400" b="1" dirty="0">
-                <a:solidFill>
-                  <a:srgbClr val="FFC000"/>
-                </a:solidFill>
-              </a:rPr>
-              <a:t>Cabecera de detalle</a:t>
-            </a:r>
-            <a:endParaRPr lang="en-US" sz="1400" b="1" dirty="0">
-              <a:solidFill>
-                <a:srgbClr val="FFC000"/>
-              </a:solidFill>
-            </a:endParaRPr>
-          </a:p>
-        </p:txBody>
-      </p:sp>
       <p:cxnSp>
         <p:nvCxnSpPr>
-          <p:cNvPr id="25" name="Straight Arrow Connector 24">
-            <a:extLst>
-              <a:ext uri="{FF2B5EF4-FFF2-40B4-BE49-F238E27FC236}">
-                <a16:creationId xmlns:a16="http://schemas.microsoft.com/office/drawing/2014/main" id="{466CF93B-A3EC-7B7D-B172-E9998E40BB2A}"/>
+          <p:cNvPr id="27" name="Straight Connector 26">
+            <a:extLst>
+              <a:ext uri="{FF2B5EF4-FFF2-40B4-BE49-F238E27FC236}">
+                <a16:creationId xmlns:a16="http://schemas.microsoft.com/office/drawing/2014/main" id="{58584A5F-16B8-FA9D-2CBF-398EBCFE23EB}"/>
               </a:ext>
             </a:extLst>
           </p:cNvPr>
           <p:cNvCxnSpPr>
             <a:cxnSpLocks/>
-            <a:stCxn id="7" idx="2"/>
+            <a:stCxn id="12" idx="3"/>
+            <a:endCxn id="4" idx="1"/>
           </p:cNvCxnSpPr>
           <p:nvPr/>
         </p:nvCxnSpPr>
         <p:spPr>
-          <a:xfrm flipH="1">
-            <a:off x="5917720" y="5607170"/>
-            <a:ext cx="1" cy="258792"/>
-          </a:xfrm>
-          <a:prstGeom prst="straightConnector1">
+          <a:xfrm flipV="1">
+            <a:off x="3615328" y="2965200"/>
+            <a:ext cx="889898" cy="2203231"/>
+          </a:xfrm>
+          <a:prstGeom prst="line">
             <a:avLst/>
           </a:prstGeom>
-          <a:ln w="38100">
-            <a:solidFill>
-              <a:srgbClr val="00B0F0"/>
-            </a:solidFill>
-            <a:tailEnd type="triangle"/>
-          </a:ln>
+          <a:ln w="19050"/>
         </p:spPr>
         <p:style>
           <a:lnRef idx="1">
@@ -5006,125 +5818,31 @@
           </a:fontRef>
         </p:style>
       </p:cxnSp>
-      <p:sp>
-        <p:nvSpPr>
-          <p:cNvPr id="29" name="TextBox 28">
-            <a:extLst>
-              <a:ext uri="{FF2B5EF4-FFF2-40B4-BE49-F238E27FC236}">
-                <a16:creationId xmlns:a16="http://schemas.microsoft.com/office/drawing/2014/main" id="{49BF1DCF-5FBD-3740-A8B1-B4F78B4B2DAE}"/>
-              </a:ext>
-            </a:extLst>
-          </p:cNvPr>
-          <p:cNvSpPr txBox="1"/>
-          <p:nvPr/>
-        </p:nvSpPr>
-        <p:spPr>
-          <a:xfrm>
-            <a:off x="4216644" y="5865962"/>
-            <a:ext cx="3462538" cy="307777"/>
-          </a:xfrm>
-          <a:prstGeom prst="rect">
-            <a:avLst/>
-          </a:prstGeom>
-          <a:noFill/>
-        </p:spPr>
-        <p:txBody>
-          <a:bodyPr wrap="square" rtlCol="0">
-            <a:spAutoFit/>
-          </a:bodyPr>
-          <a:lstStyle/>
-          <a:p>
-            <a:pPr algn="ctr"/>
-            <a:r>
-              <a:rPr lang="es-ES" sz="1400" b="1" dirty="0">
-                <a:solidFill>
-                  <a:srgbClr val="00B0F0"/>
-                </a:solidFill>
-              </a:rPr>
-              <a:t>Controladores de página detalle</a:t>
-            </a:r>
-            <a:endParaRPr lang="en-US" sz="1400" b="1" dirty="0">
-              <a:solidFill>
-                <a:srgbClr val="00B0F0"/>
-              </a:solidFill>
-            </a:endParaRPr>
-          </a:p>
-        </p:txBody>
-      </p:sp>
-      <p:sp>
-        <p:nvSpPr>
-          <p:cNvPr id="30" name="TextBox 29">
-            <a:extLst>
-              <a:ext uri="{FF2B5EF4-FFF2-40B4-BE49-F238E27FC236}">
-                <a16:creationId xmlns:a16="http://schemas.microsoft.com/office/drawing/2014/main" id="{004518D8-428E-43E5-7AEC-03BAC99CBE29}"/>
-              </a:ext>
-            </a:extLst>
-          </p:cNvPr>
-          <p:cNvSpPr txBox="1"/>
-          <p:nvPr/>
-        </p:nvSpPr>
-        <p:spPr>
-          <a:xfrm>
-            <a:off x="7648989" y="5713859"/>
-            <a:ext cx="3462538" cy="307777"/>
-          </a:xfrm>
-          <a:prstGeom prst="rect">
-            <a:avLst/>
-          </a:prstGeom>
-          <a:noFill/>
-        </p:spPr>
-        <p:txBody>
-          <a:bodyPr wrap="square" rtlCol="0">
-            <a:spAutoFit/>
-          </a:bodyPr>
-          <a:lstStyle/>
-          <a:p>
-            <a:pPr algn="ctr"/>
-            <a:r>
-              <a:rPr lang="es-ES" sz="1400" b="1" dirty="0">
-                <a:solidFill>
-                  <a:srgbClr val="92D050"/>
-                </a:solidFill>
-              </a:rPr>
-              <a:t>Tabla de detalle</a:t>
-            </a:r>
-            <a:endParaRPr lang="en-US" sz="1400" b="1" dirty="0">
-              <a:solidFill>
-                <a:srgbClr val="92D050"/>
-              </a:solidFill>
-            </a:endParaRPr>
-          </a:p>
-        </p:txBody>
-      </p:sp>
       <p:cxnSp>
         <p:nvCxnSpPr>
-          <p:cNvPr id="31" name="Straight Arrow Connector 30">
-            <a:extLst>
-              <a:ext uri="{FF2B5EF4-FFF2-40B4-BE49-F238E27FC236}">
-                <a16:creationId xmlns:a16="http://schemas.microsoft.com/office/drawing/2014/main" id="{EF8AE0CA-83BC-C63B-A192-D1EF58C1D853}"/>
+          <p:cNvPr id="31" name="Straight Connector 30">
+            <a:extLst>
+              <a:ext uri="{FF2B5EF4-FFF2-40B4-BE49-F238E27FC236}">
+                <a16:creationId xmlns:a16="http://schemas.microsoft.com/office/drawing/2014/main" id="{94C4C0D0-7249-194C-765A-776578DA1ED2}"/>
               </a:ext>
             </a:extLst>
           </p:cNvPr>
           <p:cNvCxnSpPr>
             <a:cxnSpLocks/>
-            <a:endCxn id="30" idx="0"/>
+            <a:stCxn id="4" idx="3"/>
+            <a:endCxn id="7" idx="1"/>
           </p:cNvCxnSpPr>
           <p:nvPr/>
         </p:nvCxnSpPr>
         <p:spPr>
-          <a:xfrm>
-            <a:off x="9350066" y="5306038"/>
-            <a:ext cx="30192" cy="407821"/>
-          </a:xfrm>
-          <a:prstGeom prst="straightConnector1">
+          <a:xfrm flipV="1">
+            <a:off x="5402373" y="1821381"/>
+            <a:ext cx="904398" cy="1143819"/>
+          </a:xfrm>
+          <a:prstGeom prst="line">
             <a:avLst/>
           </a:prstGeom>
-          <a:ln w="38100">
-            <a:solidFill>
-              <a:srgbClr val="92D050"/>
-            </a:solidFill>
-            <a:tailEnd type="triangle"/>
-          </a:ln>
+          <a:ln w="19050"/>
         </p:spPr>
         <p:style>
           <a:lnRef idx="1">
@@ -5141,10 +5859,809 @@
           </a:fontRef>
         </p:style>
       </p:cxnSp>
+      <p:cxnSp>
+        <p:nvCxnSpPr>
+          <p:cNvPr id="32" name="Straight Connector 31">
+            <a:extLst>
+              <a:ext uri="{FF2B5EF4-FFF2-40B4-BE49-F238E27FC236}">
+                <a16:creationId xmlns:a16="http://schemas.microsoft.com/office/drawing/2014/main" id="{56BE1FE9-339A-42EF-4B48-F67883390084}"/>
+              </a:ext>
+            </a:extLst>
+          </p:cNvPr>
+          <p:cNvCxnSpPr>
+            <a:cxnSpLocks/>
+            <a:stCxn id="4" idx="3"/>
+            <a:endCxn id="9" idx="1"/>
+          </p:cNvCxnSpPr>
+          <p:nvPr/>
+        </p:nvCxnSpPr>
+        <p:spPr>
+          <a:xfrm>
+            <a:off x="5402373" y="2965200"/>
+            <a:ext cx="904397" cy="2203231"/>
+          </a:xfrm>
+          <a:prstGeom prst="line">
+            <a:avLst/>
+          </a:prstGeom>
+          <a:ln w="19050"/>
+        </p:spPr>
+        <p:style>
+          <a:lnRef idx="1">
+            <a:schemeClr val="accent1"/>
+          </a:lnRef>
+          <a:fillRef idx="0">
+            <a:schemeClr val="accent1"/>
+          </a:fillRef>
+          <a:effectRef idx="0">
+            <a:schemeClr val="accent1"/>
+          </a:effectRef>
+          <a:fontRef idx="minor">
+            <a:schemeClr val="tx1"/>
+          </a:fontRef>
+        </p:style>
+      </p:cxnSp>
+      <p:cxnSp>
+        <p:nvCxnSpPr>
+          <p:cNvPr id="37" name="Straight Connector 36">
+            <a:extLst>
+              <a:ext uri="{FF2B5EF4-FFF2-40B4-BE49-F238E27FC236}">
+                <a16:creationId xmlns:a16="http://schemas.microsoft.com/office/drawing/2014/main" id="{B6F23FB4-1246-5BFC-F12C-A7C352244389}"/>
+              </a:ext>
+            </a:extLst>
+          </p:cNvPr>
+          <p:cNvCxnSpPr>
+            <a:cxnSpLocks/>
+            <a:stCxn id="4" idx="3"/>
+            <a:endCxn id="8" idx="1"/>
+          </p:cNvCxnSpPr>
+          <p:nvPr/>
+        </p:nvCxnSpPr>
+        <p:spPr>
+          <a:xfrm>
+            <a:off x="5402373" y="2965200"/>
+            <a:ext cx="904397" cy="529706"/>
+          </a:xfrm>
+          <a:prstGeom prst="line">
+            <a:avLst/>
+          </a:prstGeom>
+          <a:ln w="19050"/>
+        </p:spPr>
+        <p:style>
+          <a:lnRef idx="1">
+            <a:schemeClr val="accent1"/>
+          </a:lnRef>
+          <a:fillRef idx="0">
+            <a:schemeClr val="accent1"/>
+          </a:fillRef>
+          <a:effectRef idx="0">
+            <a:schemeClr val="accent1"/>
+          </a:effectRef>
+          <a:fontRef idx="minor">
+            <a:schemeClr val="tx1"/>
+          </a:fontRef>
+        </p:style>
+      </p:cxnSp>
+      <p:cxnSp>
+        <p:nvCxnSpPr>
+          <p:cNvPr id="40" name="Straight Connector 39">
+            <a:extLst>
+              <a:ext uri="{FF2B5EF4-FFF2-40B4-BE49-F238E27FC236}">
+                <a16:creationId xmlns:a16="http://schemas.microsoft.com/office/drawing/2014/main" id="{394802A3-5487-8654-6E00-F57680796947}"/>
+              </a:ext>
+            </a:extLst>
+          </p:cNvPr>
+          <p:cNvCxnSpPr>
+            <a:cxnSpLocks/>
+            <a:stCxn id="10" idx="3"/>
+            <a:endCxn id="5" idx="1"/>
+          </p:cNvCxnSpPr>
+          <p:nvPr/>
+        </p:nvCxnSpPr>
+        <p:spPr>
+          <a:xfrm>
+            <a:off x="3615329" y="1821381"/>
+            <a:ext cx="897147" cy="2761661"/>
+          </a:xfrm>
+          <a:prstGeom prst="line">
+            <a:avLst/>
+          </a:prstGeom>
+          <a:ln w="19050">
+            <a:solidFill>
+              <a:schemeClr val="accent4"/>
+            </a:solidFill>
+          </a:ln>
+        </p:spPr>
+        <p:style>
+          <a:lnRef idx="1">
+            <a:schemeClr val="accent1"/>
+          </a:lnRef>
+          <a:fillRef idx="0">
+            <a:schemeClr val="accent1"/>
+          </a:fillRef>
+          <a:effectRef idx="0">
+            <a:schemeClr val="accent1"/>
+          </a:effectRef>
+          <a:fontRef idx="minor">
+            <a:schemeClr val="tx1"/>
+          </a:fontRef>
+        </p:style>
+      </p:cxnSp>
+      <p:cxnSp>
+        <p:nvCxnSpPr>
+          <p:cNvPr id="44" name="Straight Connector 43">
+            <a:extLst>
+              <a:ext uri="{FF2B5EF4-FFF2-40B4-BE49-F238E27FC236}">
+                <a16:creationId xmlns:a16="http://schemas.microsoft.com/office/drawing/2014/main" id="{9FC1351A-008E-8CBF-048C-F026B2FA5B7D}"/>
+              </a:ext>
+            </a:extLst>
+          </p:cNvPr>
+          <p:cNvCxnSpPr>
+            <a:cxnSpLocks/>
+            <a:stCxn id="11" idx="3"/>
+            <a:endCxn id="5" idx="1"/>
+          </p:cNvCxnSpPr>
+          <p:nvPr/>
+        </p:nvCxnSpPr>
+        <p:spPr>
+          <a:xfrm>
+            <a:off x="3615328" y="3494906"/>
+            <a:ext cx="897148" cy="1088136"/>
+          </a:xfrm>
+          <a:prstGeom prst="line">
+            <a:avLst/>
+          </a:prstGeom>
+          <a:ln w="19050">
+            <a:solidFill>
+              <a:schemeClr val="accent4"/>
+            </a:solidFill>
+          </a:ln>
+        </p:spPr>
+        <p:style>
+          <a:lnRef idx="1">
+            <a:schemeClr val="accent1"/>
+          </a:lnRef>
+          <a:fillRef idx="0">
+            <a:schemeClr val="accent1"/>
+          </a:fillRef>
+          <a:effectRef idx="0">
+            <a:schemeClr val="accent1"/>
+          </a:effectRef>
+          <a:fontRef idx="minor">
+            <a:schemeClr val="tx1"/>
+          </a:fontRef>
+        </p:style>
+      </p:cxnSp>
+      <p:cxnSp>
+        <p:nvCxnSpPr>
+          <p:cNvPr id="47" name="Straight Connector 46">
+            <a:extLst>
+              <a:ext uri="{FF2B5EF4-FFF2-40B4-BE49-F238E27FC236}">
+                <a16:creationId xmlns:a16="http://schemas.microsoft.com/office/drawing/2014/main" id="{1A44550C-48E9-D28D-E12E-D299863DBB11}"/>
+              </a:ext>
+            </a:extLst>
+          </p:cNvPr>
+          <p:cNvCxnSpPr>
+            <a:cxnSpLocks/>
+            <a:stCxn id="12" idx="3"/>
+            <a:endCxn id="5" idx="1"/>
+          </p:cNvCxnSpPr>
+          <p:nvPr/>
+        </p:nvCxnSpPr>
+        <p:spPr>
+          <a:xfrm flipV="1">
+            <a:off x="3615328" y="4583042"/>
+            <a:ext cx="897148" cy="585389"/>
+          </a:xfrm>
+          <a:prstGeom prst="line">
+            <a:avLst/>
+          </a:prstGeom>
+          <a:ln w="19050">
+            <a:solidFill>
+              <a:schemeClr val="accent4"/>
+            </a:solidFill>
+          </a:ln>
+        </p:spPr>
+        <p:style>
+          <a:lnRef idx="1">
+            <a:schemeClr val="accent1"/>
+          </a:lnRef>
+          <a:fillRef idx="0">
+            <a:schemeClr val="accent1"/>
+          </a:fillRef>
+          <a:effectRef idx="0">
+            <a:schemeClr val="accent1"/>
+          </a:effectRef>
+          <a:fontRef idx="minor">
+            <a:schemeClr val="tx1"/>
+          </a:fontRef>
+        </p:style>
+      </p:cxnSp>
+      <p:cxnSp>
+        <p:nvCxnSpPr>
+          <p:cNvPr id="50" name="Straight Connector 49">
+            <a:extLst>
+              <a:ext uri="{FF2B5EF4-FFF2-40B4-BE49-F238E27FC236}">
+                <a16:creationId xmlns:a16="http://schemas.microsoft.com/office/drawing/2014/main" id="{93EC0FCD-7BD6-D87A-716B-447B78C92C6B}"/>
+              </a:ext>
+            </a:extLst>
+          </p:cNvPr>
+          <p:cNvCxnSpPr>
+            <a:cxnSpLocks/>
+            <a:stCxn id="9" idx="1"/>
+            <a:endCxn id="5" idx="3"/>
+          </p:cNvCxnSpPr>
+          <p:nvPr/>
+        </p:nvCxnSpPr>
+        <p:spPr>
+          <a:xfrm flipH="1" flipV="1">
+            <a:off x="5409623" y="4583042"/>
+            <a:ext cx="897147" cy="585389"/>
+          </a:xfrm>
+          <a:prstGeom prst="line">
+            <a:avLst/>
+          </a:prstGeom>
+          <a:ln w="19050">
+            <a:solidFill>
+              <a:schemeClr val="accent4"/>
+            </a:solidFill>
+          </a:ln>
+        </p:spPr>
+        <p:style>
+          <a:lnRef idx="1">
+            <a:schemeClr val="accent1"/>
+          </a:lnRef>
+          <a:fillRef idx="0">
+            <a:schemeClr val="accent1"/>
+          </a:fillRef>
+          <a:effectRef idx="0">
+            <a:schemeClr val="accent1"/>
+          </a:effectRef>
+          <a:fontRef idx="minor">
+            <a:schemeClr val="tx1"/>
+          </a:fontRef>
+        </p:style>
+      </p:cxnSp>
+      <p:cxnSp>
+        <p:nvCxnSpPr>
+          <p:cNvPr id="53" name="Straight Connector 52">
+            <a:extLst>
+              <a:ext uri="{FF2B5EF4-FFF2-40B4-BE49-F238E27FC236}">
+                <a16:creationId xmlns:a16="http://schemas.microsoft.com/office/drawing/2014/main" id="{9C347D4D-DDEE-1725-CB9E-CFC189A5A9F1}"/>
+              </a:ext>
+            </a:extLst>
+          </p:cNvPr>
+          <p:cNvCxnSpPr>
+            <a:cxnSpLocks/>
+            <a:stCxn id="8" idx="1"/>
+            <a:endCxn id="5" idx="3"/>
+          </p:cNvCxnSpPr>
+          <p:nvPr/>
+        </p:nvCxnSpPr>
+        <p:spPr>
+          <a:xfrm flipH="1">
+            <a:off x="5409623" y="3494906"/>
+            <a:ext cx="897147" cy="1088136"/>
+          </a:xfrm>
+          <a:prstGeom prst="line">
+            <a:avLst/>
+          </a:prstGeom>
+          <a:ln w="19050">
+            <a:solidFill>
+              <a:schemeClr val="accent4"/>
+            </a:solidFill>
+          </a:ln>
+        </p:spPr>
+        <p:style>
+          <a:lnRef idx="1">
+            <a:schemeClr val="accent1"/>
+          </a:lnRef>
+          <a:fillRef idx="0">
+            <a:schemeClr val="accent1"/>
+          </a:fillRef>
+          <a:effectRef idx="0">
+            <a:schemeClr val="accent1"/>
+          </a:effectRef>
+          <a:fontRef idx="minor">
+            <a:schemeClr val="tx1"/>
+          </a:fontRef>
+        </p:style>
+      </p:cxnSp>
+      <p:cxnSp>
+        <p:nvCxnSpPr>
+          <p:cNvPr id="57" name="Straight Connector 56">
+            <a:extLst>
+              <a:ext uri="{FF2B5EF4-FFF2-40B4-BE49-F238E27FC236}">
+                <a16:creationId xmlns:a16="http://schemas.microsoft.com/office/drawing/2014/main" id="{D8D66D31-7959-7261-A124-81C39D195CE6}"/>
+              </a:ext>
+            </a:extLst>
+          </p:cNvPr>
+          <p:cNvCxnSpPr>
+            <a:cxnSpLocks/>
+            <a:stCxn id="7" idx="1"/>
+            <a:endCxn id="5" idx="3"/>
+          </p:cNvCxnSpPr>
+          <p:nvPr/>
+        </p:nvCxnSpPr>
+        <p:spPr>
+          <a:xfrm flipH="1">
+            <a:off x="5409623" y="1821381"/>
+            <a:ext cx="897148" cy="2761661"/>
+          </a:xfrm>
+          <a:prstGeom prst="line">
+            <a:avLst/>
+          </a:prstGeom>
+          <a:ln w="19050">
+            <a:solidFill>
+              <a:schemeClr val="accent4"/>
+            </a:solidFill>
+          </a:ln>
+        </p:spPr>
+        <p:style>
+          <a:lnRef idx="1">
+            <a:schemeClr val="accent1"/>
+          </a:lnRef>
+          <a:fillRef idx="0">
+            <a:schemeClr val="accent1"/>
+          </a:fillRef>
+          <a:effectRef idx="0">
+            <a:schemeClr val="accent1"/>
+          </a:effectRef>
+          <a:fontRef idx="minor">
+            <a:schemeClr val="tx1"/>
+          </a:fontRef>
+        </p:style>
+      </p:cxnSp>
+      <p:cxnSp>
+        <p:nvCxnSpPr>
+          <p:cNvPr id="73" name="Straight Connector 72">
+            <a:extLst>
+              <a:ext uri="{FF2B5EF4-FFF2-40B4-BE49-F238E27FC236}">
+                <a16:creationId xmlns:a16="http://schemas.microsoft.com/office/drawing/2014/main" id="{EA465F11-BF42-E2A0-5D8E-92FF5BE281B5}"/>
+              </a:ext>
+            </a:extLst>
+          </p:cNvPr>
+          <p:cNvCxnSpPr>
+            <a:cxnSpLocks/>
+            <a:stCxn id="12" idx="1"/>
+            <a:endCxn id="6" idx="3"/>
+          </p:cNvCxnSpPr>
+          <p:nvPr/>
+        </p:nvCxnSpPr>
+        <p:spPr>
+          <a:xfrm flipH="1" flipV="1">
+            <a:off x="1308833" y="3482829"/>
+            <a:ext cx="1409348" cy="1685602"/>
+          </a:xfrm>
+          <a:prstGeom prst="line">
+            <a:avLst/>
+          </a:prstGeom>
+          <a:ln w="19050">
+            <a:solidFill>
+              <a:srgbClr val="C00000"/>
+            </a:solidFill>
+          </a:ln>
+        </p:spPr>
+        <p:style>
+          <a:lnRef idx="1">
+            <a:schemeClr val="accent1"/>
+          </a:lnRef>
+          <a:fillRef idx="0">
+            <a:schemeClr val="accent1"/>
+          </a:fillRef>
+          <a:effectRef idx="0">
+            <a:schemeClr val="accent1"/>
+          </a:effectRef>
+          <a:fontRef idx="minor">
+            <a:schemeClr val="tx1"/>
+          </a:fontRef>
+        </p:style>
+      </p:cxnSp>
+      <p:cxnSp>
+        <p:nvCxnSpPr>
+          <p:cNvPr id="76" name="Straight Connector 75">
+            <a:extLst>
+              <a:ext uri="{FF2B5EF4-FFF2-40B4-BE49-F238E27FC236}">
+                <a16:creationId xmlns:a16="http://schemas.microsoft.com/office/drawing/2014/main" id="{ED26E7DF-E506-2D7F-DF40-27C2B68A5D44}"/>
+              </a:ext>
+            </a:extLst>
+          </p:cNvPr>
+          <p:cNvCxnSpPr>
+            <a:cxnSpLocks/>
+            <a:stCxn id="6" idx="3"/>
+            <a:endCxn id="10" idx="1"/>
+          </p:cNvCxnSpPr>
+          <p:nvPr/>
+        </p:nvCxnSpPr>
+        <p:spPr>
+          <a:xfrm flipV="1">
+            <a:off x="1308833" y="1821381"/>
+            <a:ext cx="1409349" cy="1661448"/>
+          </a:xfrm>
+          <a:prstGeom prst="line">
+            <a:avLst/>
+          </a:prstGeom>
+          <a:ln w="19050">
+            <a:solidFill>
+              <a:srgbClr val="C00000"/>
+            </a:solidFill>
+          </a:ln>
+        </p:spPr>
+        <p:style>
+          <a:lnRef idx="1">
+            <a:schemeClr val="accent1"/>
+          </a:lnRef>
+          <a:fillRef idx="0">
+            <a:schemeClr val="accent1"/>
+          </a:fillRef>
+          <a:effectRef idx="0">
+            <a:schemeClr val="accent1"/>
+          </a:effectRef>
+          <a:fontRef idx="minor">
+            <a:schemeClr val="tx1"/>
+          </a:fontRef>
+        </p:style>
+      </p:cxnSp>
+      <p:cxnSp>
+        <p:nvCxnSpPr>
+          <p:cNvPr id="81" name="Straight Connector 80">
+            <a:extLst>
+              <a:ext uri="{FF2B5EF4-FFF2-40B4-BE49-F238E27FC236}">
+                <a16:creationId xmlns:a16="http://schemas.microsoft.com/office/drawing/2014/main" id="{487DDA88-5F1D-C653-EEA0-EC0E2092D9F9}"/>
+              </a:ext>
+            </a:extLst>
+          </p:cNvPr>
+          <p:cNvCxnSpPr>
+            <a:cxnSpLocks/>
+            <a:stCxn id="11" idx="1"/>
+            <a:endCxn id="6" idx="3"/>
+          </p:cNvCxnSpPr>
+          <p:nvPr/>
+        </p:nvCxnSpPr>
+        <p:spPr>
+          <a:xfrm flipH="1" flipV="1">
+            <a:off x="1308833" y="3482829"/>
+            <a:ext cx="1409348" cy="12077"/>
+          </a:xfrm>
+          <a:prstGeom prst="line">
+            <a:avLst/>
+          </a:prstGeom>
+          <a:ln w="19050">
+            <a:solidFill>
+              <a:srgbClr val="C00000"/>
+            </a:solidFill>
+          </a:ln>
+        </p:spPr>
+        <p:style>
+          <a:lnRef idx="1">
+            <a:schemeClr val="accent1"/>
+          </a:lnRef>
+          <a:fillRef idx="0">
+            <a:schemeClr val="accent1"/>
+          </a:fillRef>
+          <a:effectRef idx="0">
+            <a:schemeClr val="accent1"/>
+          </a:effectRef>
+          <a:fontRef idx="minor">
+            <a:schemeClr val="tx1"/>
+          </a:fontRef>
+        </p:style>
+      </p:cxnSp>
+      <p:sp>
+        <p:nvSpPr>
+          <p:cNvPr id="84" name="TextBox 83">
+            <a:extLst>
+              <a:ext uri="{FF2B5EF4-FFF2-40B4-BE49-F238E27FC236}">
+                <a16:creationId xmlns:a16="http://schemas.microsoft.com/office/drawing/2014/main" id="{AF59A7F0-EA9F-04CC-3B22-11AA7335B6D0}"/>
+              </a:ext>
+            </a:extLst>
+          </p:cNvPr>
+          <p:cNvSpPr txBox="1"/>
+          <p:nvPr/>
+        </p:nvSpPr>
+        <p:spPr>
+          <a:xfrm>
+            <a:off x="5877435" y="525054"/>
+            <a:ext cx="1747194" cy="369332"/>
+          </a:xfrm>
+          <a:prstGeom prst="rect">
+            <a:avLst/>
+          </a:prstGeom>
+          <a:noFill/>
+        </p:spPr>
+        <p:txBody>
+          <a:bodyPr wrap="square" rtlCol="0">
+            <a:spAutoFit/>
+          </a:bodyPr>
+          <a:lstStyle/>
+          <a:p>
+            <a:r>
+              <a:rPr lang="es-ES" dirty="0"/>
+              <a:t>Por Razón Social</a:t>
+            </a:r>
+            <a:endParaRPr lang="en-US" dirty="0"/>
+          </a:p>
+        </p:txBody>
+      </p:sp>
+      <p:sp>
+        <p:nvSpPr>
+          <p:cNvPr id="85" name="TextBox 84">
+            <a:extLst>
+              <a:ext uri="{FF2B5EF4-FFF2-40B4-BE49-F238E27FC236}">
+                <a16:creationId xmlns:a16="http://schemas.microsoft.com/office/drawing/2014/main" id="{9C1219F5-D004-3046-2CE4-10CC37F31C61}"/>
+              </a:ext>
+            </a:extLst>
+          </p:cNvPr>
+          <p:cNvSpPr txBox="1"/>
+          <p:nvPr/>
+        </p:nvSpPr>
+        <p:spPr>
+          <a:xfrm>
+            <a:off x="2367268" y="510166"/>
+            <a:ext cx="1625381" cy="369332"/>
+          </a:xfrm>
+          <a:prstGeom prst="rect">
+            <a:avLst/>
+          </a:prstGeom>
+          <a:noFill/>
+        </p:spPr>
+        <p:txBody>
+          <a:bodyPr wrap="none" rtlCol="0">
+            <a:spAutoFit/>
+          </a:bodyPr>
+          <a:lstStyle/>
+          <a:p>
+            <a:r>
+              <a:rPr lang="es-ES" dirty="0"/>
+              <a:t>Por Curso Perfil</a:t>
+            </a:r>
+            <a:endParaRPr lang="en-US" dirty="0"/>
+          </a:p>
+        </p:txBody>
+      </p:sp>
+      <p:sp>
+        <p:nvSpPr>
+          <p:cNvPr id="120" name="TextBox 119">
+            <a:extLst>
+              <a:ext uri="{FF2B5EF4-FFF2-40B4-BE49-F238E27FC236}">
+                <a16:creationId xmlns:a16="http://schemas.microsoft.com/office/drawing/2014/main" id="{252BB34E-1F7F-B92A-114D-7A2BE41CEB30}"/>
+              </a:ext>
+            </a:extLst>
+          </p:cNvPr>
+          <p:cNvSpPr txBox="1"/>
+          <p:nvPr/>
+        </p:nvSpPr>
+        <p:spPr>
+          <a:xfrm>
+            <a:off x="8100249" y="1372807"/>
+            <a:ext cx="2072427" cy="369332"/>
+          </a:xfrm>
+          <a:prstGeom prst="rect">
+            <a:avLst/>
+          </a:prstGeom>
+          <a:noFill/>
+        </p:spPr>
+        <p:txBody>
+          <a:bodyPr wrap="none" rtlCol="0">
+            <a:spAutoFit/>
+          </a:bodyPr>
+          <a:lstStyle/>
+          <a:p>
+            <a:r>
+              <a:rPr lang="es-ES" dirty="0" err="1"/>
+              <a:t>KPIs</a:t>
+            </a:r>
+            <a:r>
+              <a:rPr lang="es-ES" dirty="0"/>
+              <a:t> por Curso Perfil</a:t>
+            </a:r>
+            <a:endParaRPr lang="en-US" dirty="0"/>
+          </a:p>
+        </p:txBody>
+      </p:sp>
+      <p:sp>
+        <p:nvSpPr>
+          <p:cNvPr id="122" name="TextBox 121">
+            <a:extLst>
+              <a:ext uri="{FF2B5EF4-FFF2-40B4-BE49-F238E27FC236}">
+                <a16:creationId xmlns:a16="http://schemas.microsoft.com/office/drawing/2014/main" id="{B212B5F8-C169-48EC-488F-C1B982A070DB}"/>
+              </a:ext>
+            </a:extLst>
+          </p:cNvPr>
+          <p:cNvSpPr txBox="1"/>
+          <p:nvPr/>
+        </p:nvSpPr>
+        <p:spPr>
+          <a:xfrm>
+            <a:off x="8100249" y="3433576"/>
+            <a:ext cx="2160913" cy="369332"/>
+          </a:xfrm>
+          <a:prstGeom prst="rect">
+            <a:avLst/>
+          </a:prstGeom>
+          <a:noFill/>
+        </p:spPr>
+        <p:txBody>
+          <a:bodyPr wrap="none" rtlCol="0">
+            <a:spAutoFit/>
+          </a:bodyPr>
+          <a:lstStyle/>
+          <a:p>
+            <a:r>
+              <a:rPr lang="es-ES" dirty="0" err="1"/>
+              <a:t>KPIs</a:t>
+            </a:r>
+            <a:r>
+              <a:rPr lang="es-ES" dirty="0"/>
+              <a:t> por Razón Social</a:t>
+            </a:r>
+            <a:endParaRPr lang="en-US" dirty="0"/>
+          </a:p>
+        </p:txBody>
+      </p:sp>
+      <p:sp>
+        <p:nvSpPr>
+          <p:cNvPr id="123" name="TextBox 122">
+            <a:extLst>
+              <a:ext uri="{FF2B5EF4-FFF2-40B4-BE49-F238E27FC236}">
+                <a16:creationId xmlns:a16="http://schemas.microsoft.com/office/drawing/2014/main" id="{BE3D24D4-3165-25CC-B2C7-786D84F4620A}"/>
+              </a:ext>
+            </a:extLst>
+          </p:cNvPr>
+          <p:cNvSpPr txBox="1"/>
+          <p:nvPr/>
+        </p:nvSpPr>
+        <p:spPr>
+          <a:xfrm>
+            <a:off x="8144491" y="1944717"/>
+            <a:ext cx="2729850" cy="1200329"/>
+          </a:xfrm>
+          <a:prstGeom prst="rect">
+            <a:avLst/>
+          </a:prstGeom>
+          <a:noFill/>
+        </p:spPr>
+        <p:txBody>
+          <a:bodyPr wrap="none" rtlCol="0">
+            <a:spAutoFit/>
+          </a:bodyPr>
+          <a:lstStyle/>
+          <a:p>
+            <a:pPr marL="285750" indent="-285750">
+              <a:buFont typeface="Arial" panose="020B0604020202020204" pitchFamily="34" charset="0"/>
+              <a:buChar char="•"/>
+            </a:pPr>
+            <a:r>
+              <a:rPr lang="es-ES" dirty="0" err="1"/>
+              <a:t>Num_cap_cer</a:t>
+            </a:r>
+            <a:endParaRPr lang="es-ES" dirty="0"/>
+          </a:p>
+          <a:p>
+            <a:pPr marL="285750" indent="-285750">
+              <a:buFont typeface="Arial" panose="020B0604020202020204" pitchFamily="34" charset="0"/>
+              <a:buChar char="•"/>
+            </a:pPr>
+            <a:r>
+              <a:rPr lang="es-ES" dirty="0" err="1"/>
+              <a:t>Total_horas</a:t>
+            </a:r>
+            <a:endParaRPr lang="es-ES" dirty="0"/>
+          </a:p>
+          <a:p>
+            <a:pPr marL="285750" indent="-285750">
+              <a:buFont typeface="Arial" panose="020B0604020202020204" pitchFamily="34" charset="0"/>
+              <a:buChar char="•"/>
+            </a:pPr>
+            <a:r>
+              <a:rPr lang="es-ES" dirty="0" err="1"/>
+              <a:t>Total_ganancias</a:t>
+            </a:r>
+            <a:endParaRPr lang="es-ES" dirty="0"/>
+          </a:p>
+          <a:p>
+            <a:pPr marL="285750" indent="-285750">
+              <a:buFont typeface="Arial" panose="020B0604020202020204" pitchFamily="34" charset="0"/>
+              <a:buChar char="•"/>
+            </a:pPr>
+            <a:r>
+              <a:rPr lang="es-ES" dirty="0"/>
+              <a:t>Porcentaje de asistencia</a:t>
+            </a:r>
+            <a:endParaRPr lang="en-US" dirty="0"/>
+          </a:p>
+        </p:txBody>
+      </p:sp>
+      <p:sp>
+        <p:nvSpPr>
+          <p:cNvPr id="124" name="TextBox 123">
+            <a:extLst>
+              <a:ext uri="{FF2B5EF4-FFF2-40B4-BE49-F238E27FC236}">
+                <a16:creationId xmlns:a16="http://schemas.microsoft.com/office/drawing/2014/main" id="{67C6EBDF-09C2-4660-4FB0-07AD284F68DC}"/>
+              </a:ext>
+            </a:extLst>
+          </p:cNvPr>
+          <p:cNvSpPr txBox="1"/>
+          <p:nvPr/>
+        </p:nvSpPr>
+        <p:spPr>
+          <a:xfrm>
+            <a:off x="8144491" y="4046496"/>
+            <a:ext cx="3692999" cy="1477328"/>
+          </a:xfrm>
+          <a:prstGeom prst="rect">
+            <a:avLst/>
+          </a:prstGeom>
+          <a:noFill/>
+        </p:spPr>
+        <p:txBody>
+          <a:bodyPr wrap="none" rtlCol="0">
+            <a:spAutoFit/>
+          </a:bodyPr>
+          <a:lstStyle/>
+          <a:p>
+            <a:pPr marL="285750" indent="-285750">
+              <a:buFont typeface="Arial" panose="020B0604020202020204" pitchFamily="34" charset="0"/>
+              <a:buChar char="•"/>
+            </a:pPr>
+            <a:r>
+              <a:rPr lang="es-ES" dirty="0" err="1"/>
+              <a:t>Volumen_cap_cer</a:t>
+            </a:r>
+            <a:endParaRPr lang="es-ES" dirty="0"/>
+          </a:p>
+          <a:p>
+            <a:pPr marL="285750" indent="-285750">
+              <a:buFont typeface="Arial" panose="020B0604020202020204" pitchFamily="34" charset="0"/>
+              <a:buChar char="•"/>
+            </a:pPr>
+            <a:r>
+              <a:rPr lang="es-ES" dirty="0" err="1"/>
+              <a:t>Volumen_horas</a:t>
+            </a:r>
+            <a:endParaRPr lang="es-ES" dirty="0"/>
+          </a:p>
+          <a:p>
+            <a:pPr marL="285750" indent="-285750">
+              <a:buFont typeface="Arial" panose="020B0604020202020204" pitchFamily="34" charset="0"/>
+              <a:buChar char="•"/>
+            </a:pPr>
+            <a:r>
+              <a:rPr lang="es-ES" dirty="0" err="1"/>
+              <a:t>Volumen_ganancias</a:t>
+            </a:r>
+            <a:endParaRPr lang="es-ES" dirty="0"/>
+          </a:p>
+          <a:p>
+            <a:pPr marL="285750" indent="-285750">
+              <a:buFont typeface="Arial" panose="020B0604020202020204" pitchFamily="34" charset="0"/>
+              <a:buChar char="•"/>
+            </a:pPr>
+            <a:r>
+              <a:rPr lang="es-ES" dirty="0" err="1"/>
+              <a:t>Volumen_porcentaje</a:t>
+            </a:r>
+            <a:r>
+              <a:rPr lang="es-ES" dirty="0"/>
+              <a:t> de asistencia</a:t>
+            </a:r>
+          </a:p>
+          <a:p>
+            <a:pPr marL="285750" indent="-285750">
+              <a:buFont typeface="Arial" panose="020B0604020202020204" pitchFamily="34" charset="0"/>
+              <a:buChar char="•"/>
+            </a:pPr>
+            <a:r>
+              <a:rPr lang="es-ES" dirty="0" err="1"/>
+              <a:t>Total_cursos</a:t>
+            </a:r>
+            <a:endParaRPr lang="en-US" dirty="0"/>
+          </a:p>
+        </p:txBody>
+      </p:sp>
     </p:spTree>
     <p:extLst>
       <p:ext uri="{BB962C8B-B14F-4D97-AF65-F5344CB8AC3E}">
-        <p14:creationId xmlns:p14="http://schemas.microsoft.com/office/powerpoint/2010/main" val="1417407396"/>
+        <p14:creationId xmlns:p14="http://schemas.microsoft.com/office/powerpoint/2010/main" val="1529367685"/>
       </p:ext>
     </p:extLst>
   </p:cSld>
@@ -5173,132 +6690,331 @@
       </p:grpSpPr>
       <p:pic>
         <p:nvPicPr>
-          <p:cNvPr id="1026" name="Picture 2">
-            <a:extLst>
-              <a:ext uri="{FF2B5EF4-FFF2-40B4-BE49-F238E27FC236}">
-                <a16:creationId xmlns:a16="http://schemas.microsoft.com/office/drawing/2014/main" id="{A63A0CF8-6819-AAC1-FBBA-52E1CA17A3A0}"/>
+          <p:cNvPr id="5" name="Picture 4">
+            <a:extLst>
+              <a:ext uri="{FF2B5EF4-FFF2-40B4-BE49-F238E27FC236}">
+                <a16:creationId xmlns:a16="http://schemas.microsoft.com/office/drawing/2014/main" id="{AF3A3F1E-E171-19CB-7290-BB99256129AF}"/>
               </a:ext>
             </a:extLst>
           </p:cNvPr>
           <p:cNvPicPr>
-            <a:picLocks noChangeAspect="1" noChangeArrowheads="1"/>
+            <a:picLocks noChangeAspect="1"/>
           </p:cNvPicPr>
           <p:nvPr/>
         </p:nvPicPr>
         <p:blipFill>
-          <a:blip r:embed="rId2">
-            <a:extLst>
-              <a:ext uri="{28A0092B-C50C-407E-A947-70E740481C1C}">
-                <a14:useLocalDpi xmlns:a14="http://schemas.microsoft.com/office/drawing/2010/main" val="0"/>
-              </a:ext>
-            </a:extLst>
-          </a:blip>
-          <a:srcRect/>
+          <a:blip r:embed="rId2"/>
           <a:stretch>
             <a:fillRect/>
           </a:stretch>
         </p:blipFill>
-        <p:spPr bwMode="auto">
+        <p:spPr>
           <a:xfrm>
-            <a:off x="2216785" y="-91440"/>
-            <a:ext cx="7169150" cy="6858000"/>
+            <a:off x="0" y="479104"/>
+            <a:ext cx="12197904" cy="5299904"/>
+          </a:xfrm>
+          <a:prstGeom prst="rect">
+            <a:avLst/>
+          </a:prstGeom>
+        </p:spPr>
+      </p:pic>
+      <p:sp>
+        <p:nvSpPr>
+          <p:cNvPr id="6" name="Rectangle 5">
+            <a:extLst>
+              <a:ext uri="{FF2B5EF4-FFF2-40B4-BE49-F238E27FC236}">
+                <a16:creationId xmlns:a16="http://schemas.microsoft.com/office/drawing/2014/main" id="{9199E652-0AF0-C190-1819-4A5BFE984FF6}"/>
+              </a:ext>
+            </a:extLst>
+          </p:cNvPr>
+          <p:cNvSpPr/>
+          <p:nvPr/>
+        </p:nvSpPr>
+        <p:spPr>
+          <a:xfrm>
+            <a:off x="11513259" y="1645920"/>
+            <a:ext cx="501958" cy="310896"/>
           </a:xfrm>
           <a:prstGeom prst="rect">
             <a:avLst/>
           </a:prstGeom>
           <a:noFill/>
-          <a:extLst>
-            <a:ext uri="{909E8E84-426E-40DD-AFC4-6F175D3DCCD1}">
-              <a14:hiddenFill xmlns:a14="http://schemas.microsoft.com/office/drawing/2010/main">
-                <a:solidFill>
-                  <a:srgbClr val="FFFFFF"/>
-                </a:solidFill>
-              </a14:hiddenFill>
-            </a:ext>
-          </a:extLst>
-        </p:spPr>
-      </p:pic>
-    </p:spTree>
-    <p:extLst>
-      <p:ext uri="{BB962C8B-B14F-4D97-AF65-F5344CB8AC3E}">
-        <p14:creationId xmlns:p14="http://schemas.microsoft.com/office/powerpoint/2010/main" val="1729599675"/>
-      </p:ext>
-    </p:extLst>
-  </p:cSld>
-  <p:clrMapOvr>
-    <a:masterClrMapping/>
-  </p:clrMapOvr>
-</p:sld>
-</file>
-
-<file path=ppt/slides/slide4.xml><?xml version="1.0" encoding="utf-8"?>
-<p:sld xmlns:a="http://schemas.openxmlformats.org/drawingml/2006/main" xmlns:r="http://schemas.openxmlformats.org/officeDocument/2006/relationships" xmlns:p="http://schemas.openxmlformats.org/presentationml/2006/main">
-  <p:cSld>
-    <p:spTree>
-      <p:nvGrpSpPr>
-        <p:cNvPr id="1" name=""/>
-        <p:cNvGrpSpPr/>
-        <p:nvPr/>
-      </p:nvGrpSpPr>
-      <p:grpSpPr>
-        <a:xfrm>
-          <a:off x="0" y="0"/>
-          <a:ext cx="0" cy="0"/>
-          <a:chOff x="0" y="0"/>
-          <a:chExt cx="0" cy="0"/>
-        </a:xfrm>
-      </p:grpSpPr>
-      <p:pic>
-        <p:nvPicPr>
-          <p:cNvPr id="2052" name="Picture 4">
-            <a:extLst>
-              <a:ext uri="{FF2B5EF4-FFF2-40B4-BE49-F238E27FC236}">
-                <a16:creationId xmlns:a16="http://schemas.microsoft.com/office/drawing/2014/main" id="{6C0C0BE7-43D5-2B05-6B92-9E924E8AF2BD}"/>
-              </a:ext>
-            </a:extLst>
-          </p:cNvPr>
-          <p:cNvPicPr>
-            <a:picLocks noChangeAspect="1" noChangeArrowheads="1"/>
-          </p:cNvPicPr>
+          <a:ln w="38100" cap="flat" cmpd="sng" algn="ctr">
+            <a:solidFill>
+              <a:schemeClr val="accent2"/>
+            </a:solidFill>
+            <a:prstDash val="solid"/>
+            <a:round/>
+            <a:headEnd type="none" w="med" len="med"/>
+            <a:tailEnd type="none" w="med" len="med"/>
+          </a:ln>
+        </p:spPr>
+        <p:style>
+          <a:lnRef idx="0">
+            <a:scrgbClr r="0" g="0" b="0"/>
+          </a:lnRef>
+          <a:fillRef idx="0">
+            <a:scrgbClr r="0" g="0" b="0"/>
+          </a:fillRef>
+          <a:effectRef idx="0">
+            <a:scrgbClr r="0" g="0" b="0"/>
+          </a:effectRef>
+          <a:fontRef idx="minor">
+            <a:schemeClr val="accent2"/>
+          </a:fontRef>
+        </p:style>
+        <p:txBody>
+          <a:bodyPr rtlCol="0" anchor="ctr"/>
+          <a:lstStyle/>
+          <a:p>
+            <a:pPr algn="ctr"/>
+            <a:endParaRPr lang="en-US"/>
+          </a:p>
+        </p:txBody>
+      </p:sp>
+      <p:sp>
+        <p:nvSpPr>
+          <p:cNvPr id="7" name="Rectangle 6">
+            <a:extLst>
+              <a:ext uri="{FF2B5EF4-FFF2-40B4-BE49-F238E27FC236}">
+                <a16:creationId xmlns:a16="http://schemas.microsoft.com/office/drawing/2014/main" id="{092F92A4-EDB8-6C8E-B920-CECCC8EC4142}"/>
+              </a:ext>
+            </a:extLst>
+          </p:cNvPr>
+          <p:cNvSpPr/>
           <p:nvPr/>
-        </p:nvPicPr>
-        <p:blipFill>
-          <a:blip r:embed="rId2">
-            <a:extLst>
-              <a:ext uri="{28A0092B-C50C-407E-A947-70E740481C1C}">
-                <a14:useLocalDpi xmlns:a14="http://schemas.microsoft.com/office/drawing/2010/main" val="0"/>
-              </a:ext>
-            </a:extLst>
-          </a:blip>
-          <a:srcRect/>
-          <a:stretch>
-            <a:fillRect/>
-          </a:stretch>
-        </p:blipFill>
-        <p:spPr bwMode="auto">
+        </p:nvSpPr>
+        <p:spPr>
           <a:xfrm>
-            <a:off x="2157413" y="85725"/>
-            <a:ext cx="7877175" cy="6686550"/>
+            <a:off x="302714" y="2295144"/>
+            <a:ext cx="11648494" cy="2916936"/>
           </a:xfrm>
           <a:prstGeom prst="rect">
             <a:avLst/>
           </a:prstGeom>
           <a:noFill/>
-          <a:extLst>
-            <a:ext uri="{909E8E84-426E-40DD-AFC4-6F175D3DCCD1}">
-              <a14:hiddenFill xmlns:a14="http://schemas.microsoft.com/office/drawing/2010/main">
+          <a:ln w="38100" cap="flat" cmpd="sng" algn="ctr">
+            <a:solidFill>
+              <a:srgbClr val="00B0F0"/>
+            </a:solidFill>
+            <a:prstDash val="solid"/>
+            <a:round/>
+            <a:headEnd type="none" w="med" len="med"/>
+            <a:tailEnd type="none" w="med" len="med"/>
+          </a:ln>
+        </p:spPr>
+        <p:style>
+          <a:lnRef idx="0">
+            <a:scrgbClr r="0" g="0" b="0"/>
+          </a:lnRef>
+          <a:fillRef idx="0">
+            <a:scrgbClr r="0" g="0" b="0"/>
+          </a:fillRef>
+          <a:effectRef idx="0">
+            <a:scrgbClr r="0" g="0" b="0"/>
+          </a:effectRef>
+          <a:fontRef idx="minor">
+            <a:schemeClr val="accent2"/>
+          </a:fontRef>
+        </p:style>
+        <p:txBody>
+          <a:bodyPr rtlCol="0" anchor="ctr"/>
+          <a:lstStyle/>
+          <a:p>
+            <a:pPr algn="ctr"/>
+            <a:endParaRPr lang="en-US"/>
+          </a:p>
+        </p:txBody>
+      </p:sp>
+      <p:cxnSp>
+        <p:nvCxnSpPr>
+          <p:cNvPr id="9" name="Straight Arrow Connector 8">
+            <a:extLst>
+              <a:ext uri="{FF2B5EF4-FFF2-40B4-BE49-F238E27FC236}">
+                <a16:creationId xmlns:a16="http://schemas.microsoft.com/office/drawing/2014/main" id="{65EF0B5B-B8CD-3D2A-B7B3-C20572D3745B}"/>
+              </a:ext>
+            </a:extLst>
+          </p:cNvPr>
+          <p:cNvCxnSpPr>
+            <a:stCxn id="7" idx="0"/>
+          </p:cNvCxnSpPr>
+          <p:nvPr/>
+        </p:nvCxnSpPr>
+        <p:spPr>
+          <a:xfrm flipH="1" flipV="1">
+            <a:off x="6096000" y="1755648"/>
+            <a:ext cx="30961" cy="539496"/>
+          </a:xfrm>
+          <a:prstGeom prst="straightConnector1">
+            <a:avLst/>
+          </a:prstGeom>
+          <a:ln w="28575">
+            <a:solidFill>
+              <a:srgbClr val="00B0F0"/>
+            </a:solidFill>
+            <a:tailEnd type="triangle"/>
+          </a:ln>
+        </p:spPr>
+        <p:style>
+          <a:lnRef idx="1">
+            <a:schemeClr val="accent1"/>
+          </a:lnRef>
+          <a:fillRef idx="0">
+            <a:schemeClr val="accent1"/>
+          </a:fillRef>
+          <a:effectRef idx="0">
+            <a:schemeClr val="accent1"/>
+          </a:effectRef>
+          <a:fontRef idx="minor">
+            <a:schemeClr val="tx1"/>
+          </a:fontRef>
+        </p:style>
+      </p:cxnSp>
+      <p:sp>
+        <p:nvSpPr>
+          <p:cNvPr id="10" name="TextBox 9">
+            <a:extLst>
+              <a:ext uri="{FF2B5EF4-FFF2-40B4-BE49-F238E27FC236}">
+                <a16:creationId xmlns:a16="http://schemas.microsoft.com/office/drawing/2014/main" id="{848F7B86-CD98-E758-ECF7-7F88EE4AE277}"/>
+              </a:ext>
+            </a:extLst>
+          </p:cNvPr>
+          <p:cNvSpPr txBox="1"/>
+          <p:nvPr/>
+        </p:nvSpPr>
+        <p:spPr>
+          <a:xfrm>
+            <a:off x="5625003" y="1508760"/>
+            <a:ext cx="1254511" cy="307777"/>
+          </a:xfrm>
+          <a:prstGeom prst="rect">
+            <a:avLst/>
+          </a:prstGeom>
+          <a:noFill/>
+        </p:spPr>
+        <p:txBody>
+          <a:bodyPr wrap="none" rtlCol="0">
+            <a:spAutoFit/>
+          </a:bodyPr>
+          <a:lstStyle/>
+          <a:p>
+            <a:r>
+              <a:rPr lang="es-ES" sz="1400" b="1" dirty="0">
                 <a:solidFill>
-                  <a:srgbClr val="FFFFFF"/>
+                  <a:srgbClr val="00B0F0"/>
                 </a:solidFill>
-              </a14:hiddenFill>
-            </a:ext>
-          </a:extLst>
-        </p:spPr>
-      </p:pic>
+              </a:rPr>
+              <a:t>Tabla de datos</a:t>
+            </a:r>
+            <a:endParaRPr lang="en-US" sz="1400" b="1" dirty="0">
+              <a:solidFill>
+                <a:srgbClr val="00B0F0"/>
+              </a:solidFill>
+            </a:endParaRPr>
+          </a:p>
+        </p:txBody>
+      </p:sp>
+      <p:sp>
+        <p:nvSpPr>
+          <p:cNvPr id="11" name="TextBox 10">
+            <a:extLst>
+              <a:ext uri="{FF2B5EF4-FFF2-40B4-BE49-F238E27FC236}">
+                <a16:creationId xmlns:a16="http://schemas.microsoft.com/office/drawing/2014/main" id="{2436F741-29E0-D6CE-2069-57DE6EA95B9F}"/>
+              </a:ext>
+            </a:extLst>
+          </p:cNvPr>
+          <p:cNvSpPr txBox="1"/>
+          <p:nvPr/>
+        </p:nvSpPr>
+        <p:spPr>
+          <a:xfrm>
+            <a:off x="9081435" y="1566743"/>
+            <a:ext cx="1553695" cy="307777"/>
+          </a:xfrm>
+          <a:prstGeom prst="rect">
+            <a:avLst/>
+          </a:prstGeom>
+          <a:noFill/>
+        </p:spPr>
+        <p:txBody>
+          <a:bodyPr wrap="none" rtlCol="0">
+            <a:spAutoFit/>
+          </a:bodyPr>
+          <a:lstStyle/>
+          <a:p>
+            <a:r>
+              <a:rPr lang="es-ES" sz="1400" b="1" dirty="0">
+                <a:solidFill>
+                  <a:schemeClr val="accent2"/>
+                </a:solidFill>
+              </a:rPr>
+              <a:t>Botón </a:t>
+            </a:r>
+            <a:r>
+              <a:rPr lang="es-ES" sz="1400" b="1">
+                <a:solidFill>
+                  <a:schemeClr val="accent2"/>
+                </a:solidFill>
+              </a:rPr>
+              <a:t>de descarga</a:t>
+            </a:r>
+            <a:endParaRPr lang="en-US" sz="1400" b="1" dirty="0">
+              <a:solidFill>
+                <a:schemeClr val="accent2"/>
+              </a:solidFill>
+            </a:endParaRPr>
+          </a:p>
+        </p:txBody>
+      </p:sp>
+      <p:cxnSp>
+        <p:nvCxnSpPr>
+          <p:cNvPr id="12" name="Straight Arrow Connector 11">
+            <a:extLst>
+              <a:ext uri="{FF2B5EF4-FFF2-40B4-BE49-F238E27FC236}">
+                <a16:creationId xmlns:a16="http://schemas.microsoft.com/office/drawing/2014/main" id="{E97FA9DB-AAB5-A0EA-299D-49CECDB51A95}"/>
+              </a:ext>
+            </a:extLst>
+          </p:cNvPr>
+          <p:cNvCxnSpPr>
+            <a:cxnSpLocks/>
+            <a:endCxn id="11" idx="3"/>
+          </p:cNvCxnSpPr>
+          <p:nvPr/>
+        </p:nvCxnSpPr>
+        <p:spPr>
+          <a:xfrm flipH="1" flipV="1">
+            <a:off x="10635130" y="1720632"/>
+            <a:ext cx="878129" cy="35016"/>
+          </a:xfrm>
+          <a:prstGeom prst="straightConnector1">
+            <a:avLst/>
+          </a:prstGeom>
+          <a:ln w="28575">
+            <a:solidFill>
+              <a:schemeClr val="accent2"/>
+            </a:solidFill>
+            <a:tailEnd type="triangle"/>
+          </a:ln>
+        </p:spPr>
+        <p:style>
+          <a:lnRef idx="1">
+            <a:schemeClr val="accent1"/>
+          </a:lnRef>
+          <a:fillRef idx="0">
+            <a:schemeClr val="accent1"/>
+          </a:fillRef>
+          <a:effectRef idx="0">
+            <a:schemeClr val="accent1"/>
+          </a:effectRef>
+          <a:fontRef idx="minor">
+            <a:schemeClr val="tx1"/>
+          </a:fontRef>
+        </p:style>
+      </p:cxnSp>
     </p:spTree>
     <p:extLst>
       <p:ext uri="{BB962C8B-B14F-4D97-AF65-F5344CB8AC3E}">
-        <p14:creationId xmlns:p14="http://schemas.microsoft.com/office/powerpoint/2010/main" val="4089536385"/>
+        <p14:creationId xmlns:p14="http://schemas.microsoft.com/office/powerpoint/2010/main" val="177534790"/>
       </p:ext>
     </p:extLst>
   </p:cSld>

</xml_diff>